<commit_message>
Removed backward arrrows from dataflow diagram
</commit_message>
<xml_diff>
--- a/media/dataflow.pptx
+++ b/media/dataflow.pptx
@@ -1,114 +1,19 @@
 
 <file path=ppt/presentation.xml><?xml version="1.0" encoding="utf-8"?>
-<p:presentation xmlns:a="http://schemas.openxmlformats.org/drawingml/2006/main" xmlns:r="http://schemas.openxmlformats.org/officeDocument/2006/relationships" xmlns:p="http://schemas.openxmlformats.org/presentationml/2006/main">
+<p:presentation xmlns:a="http://schemas.openxmlformats.org/drawingml/2006/main" xmlns:p="http://schemas.openxmlformats.org/presentationml/2006/main" xmlns:r="http://schemas.openxmlformats.org/officeDocument/2006/relationships" xmlns:p14="http://schemas.microsoft.com/office/powerpoint/2010/main" xmlns:p15="http://schemas.microsoft.com/office/powerpoint/2012/main" xmlns:mc="http://schemas.openxmlformats.org/markup-compatibility/2006">
   <p:sldMasterIdLst>
-    <p:sldMasterId id="2147483648" r:id="rId1"/>
+    <p:sldMasterId id="2147483648" r:id="rId2"/>
   </p:sldMasterIdLst>
   <p:sldIdLst>
-    <p:sldId id="256" r:id="rId2"/>
+    <p:sldId id="256" r:id="rId3"/>
   </p:sldIdLst>
   <p:sldSz cx="10080625" cy="7559675"/>
   <p:notesSz cx="7772400" cy="10058400"/>
-  <p:defaultTextStyle>
-    <a:defPPr>
-      <a:defRPr lang="en-US"/>
-    </a:defPPr>
-    <a:lvl1pPr marL="0" algn="l" defTabSz="914400" rtl="0" eaLnBrk="1" latinLnBrk="0" hangingPunct="1">
-      <a:defRPr sz="1800" kern="1200">
-        <a:solidFill>
-          <a:schemeClr val="tx1"/>
-        </a:solidFill>
-        <a:latin typeface="+mn-lt"/>
-        <a:ea typeface="+mn-ea"/>
-        <a:cs typeface="+mn-cs"/>
-      </a:defRPr>
-    </a:lvl1pPr>
-    <a:lvl2pPr marL="457200" algn="l" defTabSz="914400" rtl="0" eaLnBrk="1" latinLnBrk="0" hangingPunct="1">
-      <a:defRPr sz="1800" kern="1200">
-        <a:solidFill>
-          <a:schemeClr val="tx1"/>
-        </a:solidFill>
-        <a:latin typeface="+mn-lt"/>
-        <a:ea typeface="+mn-ea"/>
-        <a:cs typeface="+mn-cs"/>
-      </a:defRPr>
-    </a:lvl2pPr>
-    <a:lvl3pPr marL="914400" algn="l" defTabSz="914400" rtl="0" eaLnBrk="1" latinLnBrk="0" hangingPunct="1">
-      <a:defRPr sz="1800" kern="1200">
-        <a:solidFill>
-          <a:schemeClr val="tx1"/>
-        </a:solidFill>
-        <a:latin typeface="+mn-lt"/>
-        <a:ea typeface="+mn-ea"/>
-        <a:cs typeface="+mn-cs"/>
-      </a:defRPr>
-    </a:lvl3pPr>
-    <a:lvl4pPr marL="1371600" algn="l" defTabSz="914400" rtl="0" eaLnBrk="1" latinLnBrk="0" hangingPunct="1">
-      <a:defRPr sz="1800" kern="1200">
-        <a:solidFill>
-          <a:schemeClr val="tx1"/>
-        </a:solidFill>
-        <a:latin typeface="+mn-lt"/>
-        <a:ea typeface="+mn-ea"/>
-        <a:cs typeface="+mn-cs"/>
-      </a:defRPr>
-    </a:lvl4pPr>
-    <a:lvl5pPr marL="1828800" algn="l" defTabSz="914400" rtl="0" eaLnBrk="1" latinLnBrk="0" hangingPunct="1">
-      <a:defRPr sz="1800" kern="1200">
-        <a:solidFill>
-          <a:schemeClr val="tx1"/>
-        </a:solidFill>
-        <a:latin typeface="+mn-lt"/>
-        <a:ea typeface="+mn-ea"/>
-        <a:cs typeface="+mn-cs"/>
-      </a:defRPr>
-    </a:lvl5pPr>
-    <a:lvl6pPr marL="2286000" algn="l" defTabSz="914400" rtl="0" eaLnBrk="1" latinLnBrk="0" hangingPunct="1">
-      <a:defRPr sz="1800" kern="1200">
-        <a:solidFill>
-          <a:schemeClr val="tx1"/>
-        </a:solidFill>
-        <a:latin typeface="+mn-lt"/>
-        <a:ea typeface="+mn-ea"/>
-        <a:cs typeface="+mn-cs"/>
-      </a:defRPr>
-    </a:lvl6pPr>
-    <a:lvl7pPr marL="2743200" algn="l" defTabSz="914400" rtl="0" eaLnBrk="1" latinLnBrk="0" hangingPunct="1">
-      <a:defRPr sz="1800" kern="1200">
-        <a:solidFill>
-          <a:schemeClr val="tx1"/>
-        </a:solidFill>
-        <a:latin typeface="+mn-lt"/>
-        <a:ea typeface="+mn-ea"/>
-        <a:cs typeface="+mn-cs"/>
-      </a:defRPr>
-    </a:lvl7pPr>
-    <a:lvl8pPr marL="3200400" algn="l" defTabSz="914400" rtl="0" eaLnBrk="1" latinLnBrk="0" hangingPunct="1">
-      <a:defRPr sz="1800" kern="1200">
-        <a:solidFill>
-          <a:schemeClr val="tx1"/>
-        </a:solidFill>
-        <a:latin typeface="+mn-lt"/>
-        <a:ea typeface="+mn-ea"/>
-        <a:cs typeface="+mn-cs"/>
-      </a:defRPr>
-    </a:lvl8pPr>
-    <a:lvl9pPr marL="3657600" algn="l" defTabSz="914400" rtl="0" eaLnBrk="1" latinLnBrk="0" hangingPunct="1">
-      <a:defRPr sz="1800" kern="1200">
-        <a:solidFill>
-          <a:schemeClr val="tx1"/>
-        </a:solidFill>
-        <a:latin typeface="+mn-lt"/>
-        <a:ea typeface="+mn-ea"/>
-        <a:cs typeface="+mn-cs"/>
-      </a:defRPr>
-    </a:lvl9pPr>
-  </p:defaultTextStyle>
 </p:presentation>
 </file>
 
 <file path=ppt/slideLayouts/slideLayout1.xml><?xml version="1.0" encoding="utf-8"?>
-<p:sldLayout xmlns:a="http://schemas.openxmlformats.org/drawingml/2006/main" xmlns:r="http://schemas.openxmlformats.org/officeDocument/2006/relationships" xmlns:p="http://schemas.openxmlformats.org/presentationml/2006/main" type="blank" preserve="1">
+<p:sldLayout xmlns:a="http://schemas.openxmlformats.org/drawingml/2006/main" xmlns:p="http://schemas.openxmlformats.org/presentationml/2006/main" xmlns:r="http://schemas.openxmlformats.org/officeDocument/2006/relationships" xmlns:p14="http://schemas.microsoft.com/office/powerpoint/2010/main" xmlns:p15="http://schemas.microsoft.com/office/powerpoint/2012/main" xmlns:mc="http://schemas.openxmlformats.org/markup-compatibility/2006" type="blank" preserve="1">
   <p:cSld name="Blank Slide">
     <p:spTree>
       <p:nvGrpSpPr>
@@ -126,14 +31,11 @@
       </p:grpSpPr>
     </p:spTree>
   </p:cSld>
-  <p:clrMapOvr>
-    <a:masterClrMapping/>
-  </p:clrMapOvr>
 </p:sldLayout>
 </file>
 
 <file path=ppt/slideLayouts/slideLayout10.xml><?xml version="1.0" encoding="utf-8"?>
-<p:sldLayout xmlns:a="http://schemas.openxmlformats.org/drawingml/2006/main" xmlns:r="http://schemas.openxmlformats.org/officeDocument/2006/relationships" xmlns:p="http://schemas.openxmlformats.org/presentationml/2006/main" type="objOverTx" preserve="1">
+<p:sldLayout xmlns:a="http://schemas.openxmlformats.org/drawingml/2006/main" xmlns:p="http://schemas.openxmlformats.org/presentationml/2006/main" xmlns:r="http://schemas.openxmlformats.org/officeDocument/2006/relationships" xmlns:p14="http://schemas.microsoft.com/office/powerpoint/2010/main" xmlns:p15="http://schemas.microsoft.com/office/powerpoint/2012/main" xmlns:mc="http://schemas.openxmlformats.org/markup-compatibility/2006" type="objOverTx" preserve="1">
   <p:cSld name="Title, Content over Content">
     <p:spTree>
       <p:nvGrpSpPr>
@@ -162,17 +64,18 @@
         <p:spPr>
           <a:xfrm>
             <a:off x="504000" y="301320"/>
-            <a:ext cx="9071280" cy="1261800"/>
-          </a:xfrm>
-          <a:prstGeom prst="rect">
-            <a:avLst/>
-          </a:prstGeom>
-        </p:spPr>
-        <p:txBody>
-          <a:bodyPr lIns="0" tIns="0" rIns="0" bIns="0" anchor="ctr"/>
-          <a:lstStyle/>
-          <a:p>
-            <a:endParaRPr lang="en-US" sz="1800" b="0" strike="noStrike" spc="-1">
+            <a:ext cx="9070920" cy="1261440"/>
+          </a:xfrm>
+          <a:prstGeom prst="rect">
+            <a:avLst/>
+          </a:prstGeom>
+        </p:spPr>
+        <p:txBody>
+          <a:bodyPr lIns="0" rIns="0" tIns="0" bIns="0" anchor="ctr">
+            <a:noAutofit/>
+          </a:bodyPr>
+          <a:p>
+            <a:endParaRPr b="0" lang="en-US" sz="1800" spc="-1" strike="noStrike">
               <a:solidFill>
                 <a:srgbClr val="000000"/>
               </a:solidFill>
@@ -194,19 +97,18 @@
         <p:spPr>
           <a:xfrm>
             <a:off x="504000" y="1768680"/>
-            <a:ext cx="9072000" cy="2090880"/>
-          </a:xfrm>
-          <a:prstGeom prst="rect">
-            <a:avLst/>
-          </a:prstGeom>
-        </p:spPr>
-        <p:txBody>
-          <a:bodyPr lIns="0" tIns="0" rIns="0" bIns="0">
+            <a:ext cx="9071640" cy="2090880"/>
+          </a:xfrm>
+          <a:prstGeom prst="rect">
+            <a:avLst/>
+          </a:prstGeom>
+        </p:spPr>
+        <p:txBody>
+          <a:bodyPr lIns="0" rIns="0" tIns="0" bIns="0">
             <a:normAutofit/>
           </a:bodyPr>
-          <a:lstStyle/>
-          <a:p>
-            <a:endParaRPr lang="en-US" sz="2800" b="0" strike="noStrike" spc="-1">
+          <a:p>
+            <a:endParaRPr b="0" lang="en-US" sz="2800" spc="-1" strike="noStrike">
               <a:solidFill>
                 <a:srgbClr val="000000"/>
               </a:solidFill>
@@ -228,19 +130,18 @@
         <p:spPr>
           <a:xfrm>
             <a:off x="504000" y="4058640"/>
-            <a:ext cx="9072000" cy="2090880"/>
-          </a:xfrm>
-          <a:prstGeom prst="rect">
-            <a:avLst/>
-          </a:prstGeom>
-        </p:spPr>
-        <p:txBody>
-          <a:bodyPr lIns="0" tIns="0" rIns="0" bIns="0">
+            <a:ext cx="9071640" cy="2090880"/>
+          </a:xfrm>
+          <a:prstGeom prst="rect">
+            <a:avLst/>
+          </a:prstGeom>
+        </p:spPr>
+        <p:txBody>
+          <a:bodyPr lIns="0" rIns="0" tIns="0" bIns="0">
             <a:normAutofit/>
           </a:bodyPr>
-          <a:lstStyle/>
-          <a:p>
-            <a:endParaRPr lang="en-US" sz="2800" b="0" strike="noStrike" spc="-1">
+          <a:p>
+            <a:endParaRPr b="0" lang="en-US" sz="2800" spc="-1" strike="noStrike">
               <a:solidFill>
                 <a:srgbClr val="000000"/>
               </a:solidFill>
@@ -251,14 +152,11 @@
       </p:sp>
     </p:spTree>
   </p:cSld>
-  <p:clrMapOvr>
-    <a:masterClrMapping/>
-  </p:clrMapOvr>
 </p:sldLayout>
 </file>
 
 <file path=ppt/slideLayouts/slideLayout11.xml><?xml version="1.0" encoding="utf-8"?>
-<p:sldLayout xmlns:a="http://schemas.openxmlformats.org/drawingml/2006/main" xmlns:r="http://schemas.openxmlformats.org/officeDocument/2006/relationships" xmlns:p="http://schemas.openxmlformats.org/presentationml/2006/main" type="fourObj" preserve="1">
+<p:sldLayout xmlns:a="http://schemas.openxmlformats.org/drawingml/2006/main" xmlns:p="http://schemas.openxmlformats.org/presentationml/2006/main" xmlns:r="http://schemas.openxmlformats.org/officeDocument/2006/relationships" xmlns:p14="http://schemas.microsoft.com/office/powerpoint/2010/main" xmlns:p15="http://schemas.microsoft.com/office/powerpoint/2012/main" xmlns:mc="http://schemas.openxmlformats.org/markup-compatibility/2006" type="fourObj" preserve="1">
   <p:cSld name="Title, 4 Content">
     <p:spTree>
       <p:nvGrpSpPr>
@@ -287,17 +185,18 @@
         <p:spPr>
           <a:xfrm>
             <a:off x="504000" y="301320"/>
-            <a:ext cx="9071280" cy="1261800"/>
-          </a:xfrm>
-          <a:prstGeom prst="rect">
-            <a:avLst/>
-          </a:prstGeom>
-        </p:spPr>
-        <p:txBody>
-          <a:bodyPr lIns="0" tIns="0" rIns="0" bIns="0" anchor="ctr"/>
-          <a:lstStyle/>
-          <a:p>
-            <a:endParaRPr lang="en-US" sz="1800" b="0" strike="noStrike" spc="-1">
+            <a:ext cx="9070920" cy="1261440"/>
+          </a:xfrm>
+          <a:prstGeom prst="rect">
+            <a:avLst/>
+          </a:prstGeom>
+        </p:spPr>
+        <p:txBody>
+          <a:bodyPr lIns="0" rIns="0" tIns="0" bIns="0" anchor="ctr">
+            <a:noAutofit/>
+          </a:bodyPr>
+          <a:p>
+            <a:endParaRPr b="0" lang="en-US" sz="1800" spc="-1" strike="noStrike">
               <a:solidFill>
                 <a:srgbClr val="000000"/>
               </a:solidFill>
@@ -326,12 +225,11 @@
           </a:prstGeom>
         </p:spPr>
         <p:txBody>
-          <a:bodyPr lIns="0" tIns="0" rIns="0" bIns="0">
+          <a:bodyPr lIns="0" rIns="0" tIns="0" bIns="0">
             <a:normAutofit/>
           </a:bodyPr>
-          <a:lstStyle/>
-          <a:p>
-            <a:endParaRPr lang="en-US" sz="2800" b="0" strike="noStrike" spc="-1">
+          <a:p>
+            <a:endParaRPr b="0" lang="en-US" sz="2800" spc="-1" strike="noStrike">
               <a:solidFill>
                 <a:srgbClr val="000000"/>
               </a:solidFill>
@@ -360,12 +258,11 @@
           </a:prstGeom>
         </p:spPr>
         <p:txBody>
-          <a:bodyPr lIns="0" tIns="0" rIns="0" bIns="0">
+          <a:bodyPr lIns="0" rIns="0" tIns="0" bIns="0">
             <a:normAutofit/>
           </a:bodyPr>
-          <a:lstStyle/>
-          <a:p>
-            <a:endParaRPr lang="en-US" sz="2800" b="0" strike="noStrike" spc="-1">
+          <a:p>
+            <a:endParaRPr b="0" lang="en-US" sz="2800" spc="-1" strike="noStrike">
               <a:solidFill>
                 <a:srgbClr val="000000"/>
               </a:solidFill>
@@ -394,12 +291,11 @@
           </a:prstGeom>
         </p:spPr>
         <p:txBody>
-          <a:bodyPr lIns="0" tIns="0" rIns="0" bIns="0">
+          <a:bodyPr lIns="0" rIns="0" tIns="0" bIns="0">
             <a:normAutofit/>
           </a:bodyPr>
-          <a:lstStyle/>
-          <a:p>
-            <a:endParaRPr lang="en-US" sz="2800" b="0" strike="noStrike" spc="-1">
+          <a:p>
+            <a:endParaRPr b="0" lang="en-US" sz="2800" spc="-1" strike="noStrike">
               <a:solidFill>
                 <a:srgbClr val="000000"/>
               </a:solidFill>
@@ -428,12 +324,11 @@
           </a:prstGeom>
         </p:spPr>
         <p:txBody>
-          <a:bodyPr lIns="0" tIns="0" rIns="0" bIns="0">
+          <a:bodyPr lIns="0" rIns="0" tIns="0" bIns="0">
             <a:normAutofit/>
           </a:bodyPr>
-          <a:lstStyle/>
-          <a:p>
-            <a:endParaRPr lang="en-US" sz="2800" b="0" strike="noStrike" spc="-1">
+          <a:p>
+            <a:endParaRPr b="0" lang="en-US" sz="2800" spc="-1" strike="noStrike">
               <a:solidFill>
                 <a:srgbClr val="000000"/>
               </a:solidFill>
@@ -444,14 +339,11 @@
       </p:sp>
     </p:spTree>
   </p:cSld>
-  <p:clrMapOvr>
-    <a:masterClrMapping/>
-  </p:clrMapOvr>
 </p:sldLayout>
 </file>
 
 <file path=ppt/slideLayouts/slideLayout12.xml><?xml version="1.0" encoding="utf-8"?>
-<p:sldLayout xmlns:a="http://schemas.openxmlformats.org/drawingml/2006/main" xmlns:r="http://schemas.openxmlformats.org/officeDocument/2006/relationships" xmlns:p="http://schemas.openxmlformats.org/presentationml/2006/main" type="blank" preserve="1">
+<p:sldLayout xmlns:a="http://schemas.openxmlformats.org/drawingml/2006/main" xmlns:p="http://schemas.openxmlformats.org/presentationml/2006/main" xmlns:r="http://schemas.openxmlformats.org/officeDocument/2006/relationships" xmlns:p14="http://schemas.microsoft.com/office/powerpoint/2010/main" xmlns:p15="http://schemas.microsoft.com/office/powerpoint/2012/main" xmlns:mc="http://schemas.openxmlformats.org/markup-compatibility/2006" type="blank" preserve="1">
   <p:cSld name="Title, 6 Content">
     <p:spTree>
       <p:nvGrpSpPr>
@@ -480,17 +372,18 @@
         <p:spPr>
           <a:xfrm>
             <a:off x="504000" y="301320"/>
-            <a:ext cx="9071280" cy="1261800"/>
-          </a:xfrm>
-          <a:prstGeom prst="rect">
-            <a:avLst/>
-          </a:prstGeom>
-        </p:spPr>
-        <p:txBody>
-          <a:bodyPr lIns="0" tIns="0" rIns="0" bIns="0" anchor="ctr"/>
-          <a:lstStyle/>
-          <a:p>
-            <a:endParaRPr lang="en-US" sz="1800" b="0" strike="noStrike" spc="-1">
+            <a:ext cx="9070920" cy="1261440"/>
+          </a:xfrm>
+          <a:prstGeom prst="rect">
+            <a:avLst/>
+          </a:prstGeom>
+        </p:spPr>
+        <p:txBody>
+          <a:bodyPr lIns="0" rIns="0" tIns="0" bIns="0" anchor="ctr">
+            <a:noAutofit/>
+          </a:bodyPr>
+          <a:p>
+            <a:endParaRPr b="0" lang="en-US" sz="1800" spc="-1" strike="noStrike">
               <a:solidFill>
                 <a:srgbClr val="000000"/>
               </a:solidFill>
@@ -512,19 +405,18 @@
         <p:spPr>
           <a:xfrm>
             <a:off x="504000" y="1768680"/>
-            <a:ext cx="2921040" cy="2090880"/>
-          </a:xfrm>
-          <a:prstGeom prst="rect">
-            <a:avLst/>
-          </a:prstGeom>
-        </p:spPr>
-        <p:txBody>
-          <a:bodyPr lIns="0" tIns="0" rIns="0" bIns="0">
+            <a:ext cx="2920680" cy="2090880"/>
+          </a:xfrm>
+          <a:prstGeom prst="rect">
+            <a:avLst/>
+          </a:prstGeom>
+        </p:spPr>
+        <p:txBody>
+          <a:bodyPr lIns="0" rIns="0" tIns="0" bIns="0">
             <a:normAutofit/>
           </a:bodyPr>
-          <a:lstStyle/>
-          <a:p>
-            <a:endParaRPr lang="en-US" sz="2800" b="0" strike="noStrike" spc="-1">
+          <a:p>
+            <a:endParaRPr b="0" lang="en-US" sz="2800" spc="-1" strike="noStrike">
               <a:solidFill>
                 <a:srgbClr val="000000"/>
               </a:solidFill>
@@ -545,20 +437,19 @@
         </p:nvSpPr>
         <p:spPr>
           <a:xfrm>
-            <a:off x="3571560" y="1768680"/>
-            <a:ext cx="2921040" cy="2090880"/>
-          </a:xfrm>
-          <a:prstGeom prst="rect">
-            <a:avLst/>
-          </a:prstGeom>
-        </p:spPr>
-        <p:txBody>
-          <a:bodyPr lIns="0" tIns="0" rIns="0" bIns="0">
+            <a:off x="3571200" y="1768680"/>
+            <a:ext cx="2920680" cy="2090880"/>
+          </a:xfrm>
+          <a:prstGeom prst="rect">
+            <a:avLst/>
+          </a:prstGeom>
+        </p:spPr>
+        <p:txBody>
+          <a:bodyPr lIns="0" rIns="0" tIns="0" bIns="0">
             <a:normAutofit/>
           </a:bodyPr>
-          <a:lstStyle/>
-          <a:p>
-            <a:endParaRPr lang="en-US" sz="2800" b="0" strike="noStrike" spc="-1">
+          <a:p>
+            <a:endParaRPr b="0" lang="en-US" sz="2800" spc="-1" strike="noStrike">
               <a:solidFill>
                 <a:srgbClr val="000000"/>
               </a:solidFill>
@@ -579,20 +470,19 @@
         </p:nvSpPr>
         <p:spPr>
           <a:xfrm>
-            <a:off x="6639120" y="1768680"/>
-            <a:ext cx="2921040" cy="2090880"/>
-          </a:xfrm>
-          <a:prstGeom prst="rect">
-            <a:avLst/>
-          </a:prstGeom>
-        </p:spPr>
-        <p:txBody>
-          <a:bodyPr lIns="0" tIns="0" rIns="0" bIns="0">
+            <a:off x="6638040" y="1768680"/>
+            <a:ext cx="2920680" cy="2090880"/>
+          </a:xfrm>
+          <a:prstGeom prst="rect">
+            <a:avLst/>
+          </a:prstGeom>
+        </p:spPr>
+        <p:txBody>
+          <a:bodyPr lIns="0" rIns="0" tIns="0" bIns="0">
             <a:normAutofit/>
           </a:bodyPr>
-          <a:lstStyle/>
-          <a:p>
-            <a:endParaRPr lang="en-US" sz="2800" b="0" strike="noStrike" spc="-1">
+          <a:p>
+            <a:endParaRPr b="0" lang="en-US" sz="2800" spc="-1" strike="noStrike">
               <a:solidFill>
                 <a:srgbClr val="000000"/>
               </a:solidFill>
@@ -614,19 +504,18 @@
         <p:spPr>
           <a:xfrm>
             <a:off x="504000" y="4058640"/>
-            <a:ext cx="2921040" cy="2090880"/>
-          </a:xfrm>
-          <a:prstGeom prst="rect">
-            <a:avLst/>
-          </a:prstGeom>
-        </p:spPr>
-        <p:txBody>
-          <a:bodyPr lIns="0" tIns="0" rIns="0" bIns="0">
+            <a:ext cx="2920680" cy="2090880"/>
+          </a:xfrm>
+          <a:prstGeom prst="rect">
+            <a:avLst/>
+          </a:prstGeom>
+        </p:spPr>
+        <p:txBody>
+          <a:bodyPr lIns="0" rIns="0" tIns="0" bIns="0">
             <a:normAutofit/>
           </a:bodyPr>
-          <a:lstStyle/>
-          <a:p>
-            <a:endParaRPr lang="en-US" sz="2800" b="0" strike="noStrike" spc="-1">
+          <a:p>
+            <a:endParaRPr b="0" lang="en-US" sz="2800" spc="-1" strike="noStrike">
               <a:solidFill>
                 <a:srgbClr val="000000"/>
               </a:solidFill>
@@ -647,20 +536,19 @@
         </p:nvSpPr>
         <p:spPr>
           <a:xfrm>
-            <a:off x="3571560" y="4058640"/>
-            <a:ext cx="2921040" cy="2090880"/>
-          </a:xfrm>
-          <a:prstGeom prst="rect">
-            <a:avLst/>
-          </a:prstGeom>
-        </p:spPr>
-        <p:txBody>
-          <a:bodyPr lIns="0" tIns="0" rIns="0" bIns="0">
+            <a:off x="3571200" y="4058640"/>
+            <a:ext cx="2920680" cy="2090880"/>
+          </a:xfrm>
+          <a:prstGeom prst="rect">
+            <a:avLst/>
+          </a:prstGeom>
+        </p:spPr>
+        <p:txBody>
+          <a:bodyPr lIns="0" rIns="0" tIns="0" bIns="0">
             <a:normAutofit/>
           </a:bodyPr>
-          <a:lstStyle/>
-          <a:p>
-            <a:endParaRPr lang="en-US" sz="2800" b="0" strike="noStrike" spc="-1">
+          <a:p>
+            <a:endParaRPr b="0" lang="en-US" sz="2800" spc="-1" strike="noStrike">
               <a:solidFill>
                 <a:srgbClr val="000000"/>
               </a:solidFill>
@@ -681,20 +569,19 @@
         </p:nvSpPr>
         <p:spPr>
           <a:xfrm>
-            <a:off x="6639120" y="4058640"/>
-            <a:ext cx="2921040" cy="2090880"/>
-          </a:xfrm>
-          <a:prstGeom prst="rect">
-            <a:avLst/>
-          </a:prstGeom>
-        </p:spPr>
-        <p:txBody>
-          <a:bodyPr lIns="0" tIns="0" rIns="0" bIns="0">
+            <a:off x="6638040" y="4058640"/>
+            <a:ext cx="2920680" cy="2090880"/>
+          </a:xfrm>
+          <a:prstGeom prst="rect">
+            <a:avLst/>
+          </a:prstGeom>
+        </p:spPr>
+        <p:txBody>
+          <a:bodyPr lIns="0" rIns="0" tIns="0" bIns="0">
             <a:normAutofit/>
           </a:bodyPr>
-          <a:lstStyle/>
-          <a:p>
-            <a:endParaRPr lang="en-US" sz="2800" b="0" strike="noStrike" spc="-1">
+          <a:p>
+            <a:endParaRPr b="0" lang="en-US" sz="2800" spc="-1" strike="noStrike">
               <a:solidFill>
                 <a:srgbClr val="000000"/>
               </a:solidFill>
@@ -705,14 +592,11 @@
       </p:sp>
     </p:spTree>
   </p:cSld>
-  <p:clrMapOvr>
-    <a:masterClrMapping/>
-  </p:clrMapOvr>
 </p:sldLayout>
 </file>
 
 <file path=ppt/slideLayouts/slideLayout2.xml><?xml version="1.0" encoding="utf-8"?>
-<p:sldLayout xmlns:a="http://schemas.openxmlformats.org/drawingml/2006/main" xmlns:r="http://schemas.openxmlformats.org/officeDocument/2006/relationships" xmlns:p="http://schemas.openxmlformats.org/presentationml/2006/main" type="tx" preserve="1">
+<p:sldLayout xmlns:a="http://schemas.openxmlformats.org/drawingml/2006/main" xmlns:p="http://schemas.openxmlformats.org/presentationml/2006/main" xmlns:r="http://schemas.openxmlformats.org/officeDocument/2006/relationships" xmlns:p14="http://schemas.microsoft.com/office/powerpoint/2010/main" xmlns:p15="http://schemas.microsoft.com/office/powerpoint/2012/main" xmlns:mc="http://schemas.openxmlformats.org/markup-compatibility/2006" type="tx" preserve="1">
   <p:cSld name="Title Slide">
     <p:spTree>
       <p:nvGrpSpPr>
@@ -741,17 +625,18 @@
         <p:spPr>
           <a:xfrm>
             <a:off x="504000" y="301320"/>
-            <a:ext cx="9071280" cy="1261800"/>
-          </a:xfrm>
-          <a:prstGeom prst="rect">
-            <a:avLst/>
-          </a:prstGeom>
-        </p:spPr>
-        <p:txBody>
-          <a:bodyPr lIns="0" tIns="0" rIns="0" bIns="0" anchor="ctr"/>
-          <a:lstStyle/>
-          <a:p>
-            <a:endParaRPr lang="en-US" sz="1800" b="0" strike="noStrike" spc="-1">
+            <a:ext cx="9070920" cy="1261440"/>
+          </a:xfrm>
+          <a:prstGeom prst="rect">
+            <a:avLst/>
+          </a:prstGeom>
+        </p:spPr>
+        <p:txBody>
+          <a:bodyPr lIns="0" rIns="0" tIns="0" bIns="0" anchor="ctr">
+            <a:noAutofit/>
+          </a:bodyPr>
+          <a:p>
+            <a:endParaRPr b="0" lang="en-US" sz="1800" spc="-1" strike="noStrike">
               <a:solidFill>
                 <a:srgbClr val="000000"/>
               </a:solidFill>
@@ -773,18 +658,19 @@
         <p:spPr>
           <a:xfrm>
             <a:off x="504000" y="1768680"/>
-            <a:ext cx="9072000" cy="4384080"/>
-          </a:xfrm>
-          <a:prstGeom prst="rect">
-            <a:avLst/>
-          </a:prstGeom>
-        </p:spPr>
-        <p:txBody>
-          <a:bodyPr lIns="0" tIns="0" rIns="0" bIns="0" anchor="ctr"/>
-          <a:lstStyle/>
+            <a:ext cx="9071640" cy="4383720"/>
+          </a:xfrm>
+          <a:prstGeom prst="rect">
+            <a:avLst/>
+          </a:prstGeom>
+        </p:spPr>
+        <p:txBody>
+          <a:bodyPr lIns="0" rIns="0" tIns="0" bIns="0" anchor="ctr">
+            <a:noAutofit/>
+          </a:bodyPr>
           <a:p>
             <a:pPr algn="ctr"/>
-            <a:endParaRPr lang="en-US" sz="3200" b="0" strike="noStrike" spc="-1">
+            <a:endParaRPr b="0" lang="en-US" sz="3200" spc="-1" strike="noStrike">
               <a:latin typeface="Arial"/>
             </a:endParaRPr>
           </a:p>
@@ -792,14 +678,11 @@
       </p:sp>
     </p:spTree>
   </p:cSld>
-  <p:clrMapOvr>
-    <a:masterClrMapping/>
-  </p:clrMapOvr>
 </p:sldLayout>
 </file>
 
 <file path=ppt/slideLayouts/slideLayout3.xml><?xml version="1.0" encoding="utf-8"?>
-<p:sldLayout xmlns:a="http://schemas.openxmlformats.org/drawingml/2006/main" xmlns:r="http://schemas.openxmlformats.org/officeDocument/2006/relationships" xmlns:p="http://schemas.openxmlformats.org/presentationml/2006/main" type="obj" preserve="1">
+<p:sldLayout xmlns:a="http://schemas.openxmlformats.org/drawingml/2006/main" xmlns:p="http://schemas.openxmlformats.org/presentationml/2006/main" xmlns:r="http://schemas.openxmlformats.org/officeDocument/2006/relationships" xmlns:p14="http://schemas.microsoft.com/office/powerpoint/2010/main" xmlns:p15="http://schemas.microsoft.com/office/powerpoint/2012/main" xmlns:mc="http://schemas.openxmlformats.org/markup-compatibility/2006" type="obj" preserve="1">
   <p:cSld name="Title, Content">
     <p:spTree>
       <p:nvGrpSpPr>
@@ -828,17 +711,18 @@
         <p:spPr>
           <a:xfrm>
             <a:off x="504000" y="301320"/>
-            <a:ext cx="9071280" cy="1261800"/>
-          </a:xfrm>
-          <a:prstGeom prst="rect">
-            <a:avLst/>
-          </a:prstGeom>
-        </p:spPr>
-        <p:txBody>
-          <a:bodyPr lIns="0" tIns="0" rIns="0" bIns="0" anchor="ctr"/>
-          <a:lstStyle/>
-          <a:p>
-            <a:endParaRPr lang="en-US" sz="1800" b="0" strike="noStrike" spc="-1">
+            <a:ext cx="9070920" cy="1261440"/>
+          </a:xfrm>
+          <a:prstGeom prst="rect">
+            <a:avLst/>
+          </a:prstGeom>
+        </p:spPr>
+        <p:txBody>
+          <a:bodyPr lIns="0" rIns="0" tIns="0" bIns="0" anchor="ctr">
+            <a:noAutofit/>
+          </a:bodyPr>
+          <a:p>
+            <a:endParaRPr b="0" lang="en-US" sz="1800" spc="-1" strike="noStrike">
               <a:solidFill>
                 <a:srgbClr val="000000"/>
               </a:solidFill>
@@ -860,19 +744,18 @@
         <p:spPr>
           <a:xfrm>
             <a:off x="504000" y="1768680"/>
-            <a:ext cx="9072000" cy="4384080"/>
-          </a:xfrm>
-          <a:prstGeom prst="rect">
-            <a:avLst/>
-          </a:prstGeom>
-        </p:spPr>
-        <p:txBody>
-          <a:bodyPr lIns="0" tIns="0" rIns="0" bIns="0">
+            <a:ext cx="9071640" cy="4383720"/>
+          </a:xfrm>
+          <a:prstGeom prst="rect">
+            <a:avLst/>
+          </a:prstGeom>
+        </p:spPr>
+        <p:txBody>
+          <a:bodyPr lIns="0" rIns="0" tIns="0" bIns="0">
             <a:normAutofit/>
           </a:bodyPr>
-          <a:lstStyle/>
-          <a:p>
-            <a:endParaRPr lang="en-US" sz="2800" b="0" strike="noStrike" spc="-1">
+          <a:p>
+            <a:endParaRPr b="0" lang="en-US" sz="2800" spc="-1" strike="noStrike">
               <a:solidFill>
                 <a:srgbClr val="000000"/>
               </a:solidFill>
@@ -883,14 +766,11 @@
       </p:sp>
     </p:spTree>
   </p:cSld>
-  <p:clrMapOvr>
-    <a:masterClrMapping/>
-  </p:clrMapOvr>
 </p:sldLayout>
 </file>
 
 <file path=ppt/slideLayouts/slideLayout4.xml><?xml version="1.0" encoding="utf-8"?>
-<p:sldLayout xmlns:a="http://schemas.openxmlformats.org/drawingml/2006/main" xmlns:r="http://schemas.openxmlformats.org/officeDocument/2006/relationships" xmlns:p="http://schemas.openxmlformats.org/presentationml/2006/main" type="twoObj" preserve="1">
+<p:sldLayout xmlns:a="http://schemas.openxmlformats.org/drawingml/2006/main" xmlns:p="http://schemas.openxmlformats.org/presentationml/2006/main" xmlns:r="http://schemas.openxmlformats.org/officeDocument/2006/relationships" xmlns:p14="http://schemas.microsoft.com/office/powerpoint/2010/main" xmlns:p15="http://schemas.microsoft.com/office/powerpoint/2012/main" xmlns:mc="http://schemas.openxmlformats.org/markup-compatibility/2006" type="twoObj" preserve="1">
   <p:cSld name="Title, 2 Content">
     <p:spTree>
       <p:nvGrpSpPr>
@@ -919,17 +799,18 @@
         <p:spPr>
           <a:xfrm>
             <a:off x="504000" y="301320"/>
-            <a:ext cx="9071280" cy="1261800"/>
-          </a:xfrm>
-          <a:prstGeom prst="rect">
-            <a:avLst/>
-          </a:prstGeom>
-        </p:spPr>
-        <p:txBody>
-          <a:bodyPr lIns="0" tIns="0" rIns="0" bIns="0" anchor="ctr"/>
-          <a:lstStyle/>
-          <a:p>
-            <a:endParaRPr lang="en-US" sz="1800" b="0" strike="noStrike" spc="-1">
+            <a:ext cx="9070920" cy="1261440"/>
+          </a:xfrm>
+          <a:prstGeom prst="rect">
+            <a:avLst/>
+          </a:prstGeom>
+        </p:spPr>
+        <p:txBody>
+          <a:bodyPr lIns="0" rIns="0" tIns="0" bIns="0" anchor="ctr">
+            <a:noAutofit/>
+          </a:bodyPr>
+          <a:p>
+            <a:endParaRPr b="0" lang="en-US" sz="1800" spc="-1" strike="noStrike">
               <a:solidFill>
                 <a:srgbClr val="000000"/>
               </a:solidFill>
@@ -951,19 +832,18 @@
         <p:spPr>
           <a:xfrm>
             <a:off x="504000" y="1768680"/>
-            <a:ext cx="4426920" cy="4384080"/>
-          </a:xfrm>
-          <a:prstGeom prst="rect">
-            <a:avLst/>
-          </a:prstGeom>
-        </p:spPr>
-        <p:txBody>
-          <a:bodyPr lIns="0" tIns="0" rIns="0" bIns="0">
+            <a:ext cx="4426920" cy="4383720"/>
+          </a:xfrm>
+          <a:prstGeom prst="rect">
+            <a:avLst/>
+          </a:prstGeom>
+        </p:spPr>
+        <p:txBody>
+          <a:bodyPr lIns="0" rIns="0" tIns="0" bIns="0">
             <a:normAutofit/>
           </a:bodyPr>
-          <a:lstStyle/>
-          <a:p>
-            <a:endParaRPr lang="en-US" sz="2800" b="0" strike="noStrike" spc="-1">
+          <a:p>
+            <a:endParaRPr b="0" lang="en-US" sz="2800" spc="-1" strike="noStrike">
               <a:solidFill>
                 <a:srgbClr val="000000"/>
               </a:solidFill>
@@ -985,19 +865,18 @@
         <p:spPr>
           <a:xfrm>
             <a:off x="5152680" y="1768680"/>
-            <a:ext cx="4426920" cy="4384080"/>
-          </a:xfrm>
-          <a:prstGeom prst="rect">
-            <a:avLst/>
-          </a:prstGeom>
-        </p:spPr>
-        <p:txBody>
-          <a:bodyPr lIns="0" tIns="0" rIns="0" bIns="0">
+            <a:ext cx="4426920" cy="4383720"/>
+          </a:xfrm>
+          <a:prstGeom prst="rect">
+            <a:avLst/>
+          </a:prstGeom>
+        </p:spPr>
+        <p:txBody>
+          <a:bodyPr lIns="0" rIns="0" tIns="0" bIns="0">
             <a:normAutofit/>
           </a:bodyPr>
-          <a:lstStyle/>
-          <a:p>
-            <a:endParaRPr lang="en-US" sz="2800" b="0" strike="noStrike" spc="-1">
+          <a:p>
+            <a:endParaRPr b="0" lang="en-US" sz="2800" spc="-1" strike="noStrike">
               <a:solidFill>
                 <a:srgbClr val="000000"/>
               </a:solidFill>
@@ -1008,14 +887,11 @@
       </p:sp>
     </p:spTree>
   </p:cSld>
-  <p:clrMapOvr>
-    <a:masterClrMapping/>
-  </p:clrMapOvr>
 </p:sldLayout>
 </file>
 
 <file path=ppt/slideLayouts/slideLayout5.xml><?xml version="1.0" encoding="utf-8"?>
-<p:sldLayout xmlns:a="http://schemas.openxmlformats.org/drawingml/2006/main" xmlns:r="http://schemas.openxmlformats.org/officeDocument/2006/relationships" xmlns:p="http://schemas.openxmlformats.org/presentationml/2006/main" type="titleOnly" preserve="1">
+<p:sldLayout xmlns:a="http://schemas.openxmlformats.org/drawingml/2006/main" xmlns:p="http://schemas.openxmlformats.org/presentationml/2006/main" xmlns:r="http://schemas.openxmlformats.org/officeDocument/2006/relationships" xmlns:p14="http://schemas.microsoft.com/office/powerpoint/2010/main" xmlns:p15="http://schemas.microsoft.com/office/powerpoint/2012/main" xmlns:mc="http://schemas.openxmlformats.org/markup-compatibility/2006" type="titleOnly" preserve="1">
   <p:cSld name="Title Only">
     <p:spTree>
       <p:nvGrpSpPr>
@@ -1044,17 +920,18 @@
         <p:spPr>
           <a:xfrm>
             <a:off x="504000" y="301320"/>
-            <a:ext cx="9071280" cy="1261800"/>
-          </a:xfrm>
-          <a:prstGeom prst="rect">
-            <a:avLst/>
-          </a:prstGeom>
-        </p:spPr>
-        <p:txBody>
-          <a:bodyPr lIns="0" tIns="0" rIns="0" bIns="0" anchor="ctr"/>
-          <a:lstStyle/>
-          <a:p>
-            <a:endParaRPr lang="en-US" sz="1800" b="0" strike="noStrike" spc="-1">
+            <a:ext cx="9070920" cy="1261440"/>
+          </a:xfrm>
+          <a:prstGeom prst="rect">
+            <a:avLst/>
+          </a:prstGeom>
+        </p:spPr>
+        <p:txBody>
+          <a:bodyPr lIns="0" rIns="0" tIns="0" bIns="0" anchor="ctr">
+            <a:noAutofit/>
+          </a:bodyPr>
+          <a:p>
+            <a:endParaRPr b="0" lang="en-US" sz="1800" spc="-1" strike="noStrike">
               <a:solidFill>
                 <a:srgbClr val="000000"/>
               </a:solidFill>
@@ -1065,14 +942,11 @@
       </p:sp>
     </p:spTree>
   </p:cSld>
-  <p:clrMapOvr>
-    <a:masterClrMapping/>
-  </p:clrMapOvr>
 </p:sldLayout>
 </file>
 
 <file path=ppt/slideLayouts/slideLayout6.xml><?xml version="1.0" encoding="utf-8"?>
-<p:sldLayout xmlns:a="http://schemas.openxmlformats.org/drawingml/2006/main" xmlns:r="http://schemas.openxmlformats.org/officeDocument/2006/relationships" xmlns:p="http://schemas.openxmlformats.org/presentationml/2006/main" type="objOnly" preserve="1">
+<p:sldLayout xmlns:a="http://schemas.openxmlformats.org/drawingml/2006/main" xmlns:p="http://schemas.openxmlformats.org/presentationml/2006/main" xmlns:r="http://schemas.openxmlformats.org/officeDocument/2006/relationships" xmlns:p14="http://schemas.microsoft.com/office/powerpoint/2010/main" xmlns:p15="http://schemas.microsoft.com/office/powerpoint/2012/main" xmlns:mc="http://schemas.openxmlformats.org/markup-compatibility/2006" type="objOnly" preserve="1">
   <p:cSld name="Centered Text">
     <p:spTree>
       <p:nvGrpSpPr>
@@ -1101,18 +975,19 @@
         <p:spPr>
           <a:xfrm>
             <a:off x="504000" y="301320"/>
-            <a:ext cx="9071280" cy="5850360"/>
-          </a:xfrm>
-          <a:prstGeom prst="rect">
-            <a:avLst/>
-          </a:prstGeom>
-        </p:spPr>
-        <p:txBody>
-          <a:bodyPr lIns="0" tIns="0" rIns="0" bIns="0" anchor="ctr"/>
-          <a:lstStyle/>
+            <a:ext cx="9070920" cy="5848560"/>
+          </a:xfrm>
+          <a:prstGeom prst="rect">
+            <a:avLst/>
+          </a:prstGeom>
+        </p:spPr>
+        <p:txBody>
+          <a:bodyPr lIns="0" rIns="0" tIns="0" bIns="0" anchor="ctr">
+            <a:noAutofit/>
+          </a:bodyPr>
           <a:p>
             <a:pPr algn="ctr"/>
-            <a:endParaRPr lang="en-US" sz="3200" b="0" strike="noStrike" spc="-1">
+            <a:endParaRPr b="0" lang="en-US" sz="3200" spc="-1" strike="noStrike">
               <a:latin typeface="Arial"/>
             </a:endParaRPr>
           </a:p>
@@ -1120,14 +995,11 @@
       </p:sp>
     </p:spTree>
   </p:cSld>
-  <p:clrMapOvr>
-    <a:masterClrMapping/>
-  </p:clrMapOvr>
 </p:sldLayout>
 </file>
 
 <file path=ppt/slideLayouts/slideLayout7.xml><?xml version="1.0" encoding="utf-8"?>
-<p:sldLayout xmlns:a="http://schemas.openxmlformats.org/drawingml/2006/main" xmlns:r="http://schemas.openxmlformats.org/officeDocument/2006/relationships" xmlns:p="http://schemas.openxmlformats.org/presentationml/2006/main" type="twoObjAndObj" preserve="1">
+<p:sldLayout xmlns:a="http://schemas.openxmlformats.org/drawingml/2006/main" xmlns:p="http://schemas.openxmlformats.org/presentationml/2006/main" xmlns:r="http://schemas.openxmlformats.org/officeDocument/2006/relationships" xmlns:p14="http://schemas.microsoft.com/office/powerpoint/2010/main" xmlns:p15="http://schemas.microsoft.com/office/powerpoint/2012/main" xmlns:mc="http://schemas.openxmlformats.org/markup-compatibility/2006" type="twoObjAndObj" preserve="1">
   <p:cSld name="Title, 2 Content and Content">
     <p:spTree>
       <p:nvGrpSpPr>
@@ -1156,17 +1028,18 @@
         <p:spPr>
           <a:xfrm>
             <a:off x="504000" y="301320"/>
-            <a:ext cx="9071280" cy="1261800"/>
-          </a:xfrm>
-          <a:prstGeom prst="rect">
-            <a:avLst/>
-          </a:prstGeom>
-        </p:spPr>
-        <p:txBody>
-          <a:bodyPr lIns="0" tIns="0" rIns="0" bIns="0" anchor="ctr"/>
-          <a:lstStyle/>
-          <a:p>
-            <a:endParaRPr lang="en-US" sz="1800" b="0" strike="noStrike" spc="-1">
+            <a:ext cx="9070920" cy="1261440"/>
+          </a:xfrm>
+          <a:prstGeom prst="rect">
+            <a:avLst/>
+          </a:prstGeom>
+        </p:spPr>
+        <p:txBody>
+          <a:bodyPr lIns="0" rIns="0" tIns="0" bIns="0" anchor="ctr">
+            <a:noAutofit/>
+          </a:bodyPr>
+          <a:p>
+            <a:endParaRPr b="0" lang="en-US" sz="1800" spc="-1" strike="noStrike">
               <a:solidFill>
                 <a:srgbClr val="000000"/>
               </a:solidFill>
@@ -1195,12 +1068,11 @@
           </a:prstGeom>
         </p:spPr>
         <p:txBody>
-          <a:bodyPr lIns="0" tIns="0" rIns="0" bIns="0">
+          <a:bodyPr lIns="0" rIns="0" tIns="0" bIns="0">
             <a:normAutofit/>
           </a:bodyPr>
-          <a:lstStyle/>
-          <a:p>
-            <a:endParaRPr lang="en-US" sz="2800" b="0" strike="noStrike" spc="-1">
+          <a:p>
+            <a:endParaRPr b="0" lang="en-US" sz="2800" spc="-1" strike="noStrike">
               <a:solidFill>
                 <a:srgbClr val="000000"/>
               </a:solidFill>
@@ -1222,19 +1094,18 @@
         <p:spPr>
           <a:xfrm>
             <a:off x="5152680" y="1768680"/>
-            <a:ext cx="4426920" cy="4384080"/>
-          </a:xfrm>
-          <a:prstGeom prst="rect">
-            <a:avLst/>
-          </a:prstGeom>
-        </p:spPr>
-        <p:txBody>
-          <a:bodyPr lIns="0" tIns="0" rIns="0" bIns="0">
+            <a:ext cx="4426920" cy="4383720"/>
+          </a:xfrm>
+          <a:prstGeom prst="rect">
+            <a:avLst/>
+          </a:prstGeom>
+        </p:spPr>
+        <p:txBody>
+          <a:bodyPr lIns="0" rIns="0" tIns="0" bIns="0">
             <a:normAutofit/>
           </a:bodyPr>
-          <a:lstStyle/>
-          <a:p>
-            <a:endParaRPr lang="en-US" sz="2800" b="0" strike="noStrike" spc="-1">
+          <a:p>
+            <a:endParaRPr b="0" lang="en-US" sz="2800" spc="-1" strike="noStrike">
               <a:solidFill>
                 <a:srgbClr val="000000"/>
               </a:solidFill>
@@ -1263,12 +1134,11 @@
           </a:prstGeom>
         </p:spPr>
         <p:txBody>
-          <a:bodyPr lIns="0" tIns="0" rIns="0" bIns="0">
+          <a:bodyPr lIns="0" rIns="0" tIns="0" bIns="0">
             <a:normAutofit/>
           </a:bodyPr>
-          <a:lstStyle/>
-          <a:p>
-            <a:endParaRPr lang="en-US" sz="2800" b="0" strike="noStrike" spc="-1">
+          <a:p>
+            <a:endParaRPr b="0" lang="en-US" sz="2800" spc="-1" strike="noStrike">
               <a:solidFill>
                 <a:srgbClr val="000000"/>
               </a:solidFill>
@@ -1279,14 +1149,11 @@
       </p:sp>
     </p:spTree>
   </p:cSld>
-  <p:clrMapOvr>
-    <a:masterClrMapping/>
-  </p:clrMapOvr>
 </p:sldLayout>
 </file>
 
 <file path=ppt/slideLayouts/slideLayout8.xml><?xml version="1.0" encoding="utf-8"?>
-<p:sldLayout xmlns:a="http://schemas.openxmlformats.org/drawingml/2006/main" xmlns:r="http://schemas.openxmlformats.org/officeDocument/2006/relationships" xmlns:p="http://schemas.openxmlformats.org/presentationml/2006/main" type="objAndTwoObj" preserve="1">
+<p:sldLayout xmlns:a="http://schemas.openxmlformats.org/drawingml/2006/main" xmlns:p="http://schemas.openxmlformats.org/presentationml/2006/main" xmlns:r="http://schemas.openxmlformats.org/officeDocument/2006/relationships" xmlns:p14="http://schemas.microsoft.com/office/powerpoint/2010/main" xmlns:p15="http://schemas.microsoft.com/office/powerpoint/2012/main" xmlns:mc="http://schemas.openxmlformats.org/markup-compatibility/2006" type="objAndTwoObj" preserve="1">
   <p:cSld name="Title Content and 2 Content">
     <p:spTree>
       <p:nvGrpSpPr>
@@ -1315,17 +1182,18 @@
         <p:spPr>
           <a:xfrm>
             <a:off x="504000" y="301320"/>
-            <a:ext cx="9071280" cy="1261800"/>
-          </a:xfrm>
-          <a:prstGeom prst="rect">
-            <a:avLst/>
-          </a:prstGeom>
-        </p:spPr>
-        <p:txBody>
-          <a:bodyPr lIns="0" tIns="0" rIns="0" bIns="0" anchor="ctr"/>
-          <a:lstStyle/>
-          <a:p>
-            <a:endParaRPr lang="en-US" sz="1800" b="0" strike="noStrike" spc="-1">
+            <a:ext cx="9070920" cy="1261440"/>
+          </a:xfrm>
+          <a:prstGeom prst="rect">
+            <a:avLst/>
+          </a:prstGeom>
+        </p:spPr>
+        <p:txBody>
+          <a:bodyPr lIns="0" rIns="0" tIns="0" bIns="0" anchor="ctr">
+            <a:noAutofit/>
+          </a:bodyPr>
+          <a:p>
+            <a:endParaRPr b="0" lang="en-US" sz="1800" spc="-1" strike="noStrike">
               <a:solidFill>
                 <a:srgbClr val="000000"/>
               </a:solidFill>
@@ -1347,19 +1215,18 @@
         <p:spPr>
           <a:xfrm>
             <a:off x="504000" y="1768680"/>
-            <a:ext cx="4426920" cy="4384080"/>
-          </a:xfrm>
-          <a:prstGeom prst="rect">
-            <a:avLst/>
-          </a:prstGeom>
-        </p:spPr>
-        <p:txBody>
-          <a:bodyPr lIns="0" tIns="0" rIns="0" bIns="0">
+            <a:ext cx="4426920" cy="4383720"/>
+          </a:xfrm>
+          <a:prstGeom prst="rect">
+            <a:avLst/>
+          </a:prstGeom>
+        </p:spPr>
+        <p:txBody>
+          <a:bodyPr lIns="0" rIns="0" tIns="0" bIns="0">
             <a:normAutofit/>
           </a:bodyPr>
-          <a:lstStyle/>
-          <a:p>
-            <a:endParaRPr lang="en-US" sz="2800" b="0" strike="noStrike" spc="-1">
+          <a:p>
+            <a:endParaRPr b="0" lang="en-US" sz="2800" spc="-1" strike="noStrike">
               <a:solidFill>
                 <a:srgbClr val="000000"/>
               </a:solidFill>
@@ -1388,12 +1255,11 @@
           </a:prstGeom>
         </p:spPr>
         <p:txBody>
-          <a:bodyPr lIns="0" tIns="0" rIns="0" bIns="0">
+          <a:bodyPr lIns="0" rIns="0" tIns="0" bIns="0">
             <a:normAutofit/>
           </a:bodyPr>
-          <a:lstStyle/>
-          <a:p>
-            <a:endParaRPr lang="en-US" sz="2800" b="0" strike="noStrike" spc="-1">
+          <a:p>
+            <a:endParaRPr b="0" lang="en-US" sz="2800" spc="-1" strike="noStrike">
               <a:solidFill>
                 <a:srgbClr val="000000"/>
               </a:solidFill>
@@ -1422,12 +1288,11 @@
           </a:prstGeom>
         </p:spPr>
         <p:txBody>
-          <a:bodyPr lIns="0" tIns="0" rIns="0" bIns="0">
+          <a:bodyPr lIns="0" rIns="0" tIns="0" bIns="0">
             <a:normAutofit/>
           </a:bodyPr>
-          <a:lstStyle/>
-          <a:p>
-            <a:endParaRPr lang="en-US" sz="2800" b="0" strike="noStrike" spc="-1">
+          <a:p>
+            <a:endParaRPr b="0" lang="en-US" sz="2800" spc="-1" strike="noStrike">
               <a:solidFill>
                 <a:srgbClr val="000000"/>
               </a:solidFill>
@@ -1438,14 +1303,11 @@
       </p:sp>
     </p:spTree>
   </p:cSld>
-  <p:clrMapOvr>
-    <a:masterClrMapping/>
-  </p:clrMapOvr>
 </p:sldLayout>
 </file>
 
 <file path=ppt/slideLayouts/slideLayout9.xml><?xml version="1.0" encoding="utf-8"?>
-<p:sldLayout xmlns:a="http://schemas.openxmlformats.org/drawingml/2006/main" xmlns:r="http://schemas.openxmlformats.org/officeDocument/2006/relationships" xmlns:p="http://schemas.openxmlformats.org/presentationml/2006/main" type="twoObjOverTx" preserve="1">
+<p:sldLayout xmlns:a="http://schemas.openxmlformats.org/drawingml/2006/main" xmlns:p="http://schemas.openxmlformats.org/presentationml/2006/main" xmlns:r="http://schemas.openxmlformats.org/officeDocument/2006/relationships" xmlns:p14="http://schemas.microsoft.com/office/powerpoint/2010/main" xmlns:p15="http://schemas.microsoft.com/office/powerpoint/2012/main" xmlns:mc="http://schemas.openxmlformats.org/markup-compatibility/2006" type="twoObjOverTx" preserve="1">
   <p:cSld name="Title, 2 Content over Content">
     <p:spTree>
       <p:nvGrpSpPr>
@@ -1474,17 +1336,18 @@
         <p:spPr>
           <a:xfrm>
             <a:off x="504000" y="301320"/>
-            <a:ext cx="9071280" cy="1261800"/>
-          </a:xfrm>
-          <a:prstGeom prst="rect">
-            <a:avLst/>
-          </a:prstGeom>
-        </p:spPr>
-        <p:txBody>
-          <a:bodyPr lIns="0" tIns="0" rIns="0" bIns="0" anchor="ctr"/>
-          <a:lstStyle/>
-          <a:p>
-            <a:endParaRPr lang="en-US" sz="1800" b="0" strike="noStrike" spc="-1">
+            <a:ext cx="9070920" cy="1261440"/>
+          </a:xfrm>
+          <a:prstGeom prst="rect">
+            <a:avLst/>
+          </a:prstGeom>
+        </p:spPr>
+        <p:txBody>
+          <a:bodyPr lIns="0" rIns="0" tIns="0" bIns="0" anchor="ctr">
+            <a:noAutofit/>
+          </a:bodyPr>
+          <a:p>
+            <a:endParaRPr b="0" lang="en-US" sz="1800" spc="-1" strike="noStrike">
               <a:solidFill>
                 <a:srgbClr val="000000"/>
               </a:solidFill>
@@ -1513,12 +1376,11 @@
           </a:prstGeom>
         </p:spPr>
         <p:txBody>
-          <a:bodyPr lIns="0" tIns="0" rIns="0" bIns="0">
+          <a:bodyPr lIns="0" rIns="0" tIns="0" bIns="0">
             <a:normAutofit/>
           </a:bodyPr>
-          <a:lstStyle/>
-          <a:p>
-            <a:endParaRPr lang="en-US" sz="2800" b="0" strike="noStrike" spc="-1">
+          <a:p>
+            <a:endParaRPr b="0" lang="en-US" sz="2800" spc="-1" strike="noStrike">
               <a:solidFill>
                 <a:srgbClr val="000000"/>
               </a:solidFill>
@@ -1547,12 +1409,11 @@
           </a:prstGeom>
         </p:spPr>
         <p:txBody>
-          <a:bodyPr lIns="0" tIns="0" rIns="0" bIns="0">
+          <a:bodyPr lIns="0" rIns="0" tIns="0" bIns="0">
             <a:normAutofit/>
           </a:bodyPr>
-          <a:lstStyle/>
-          <a:p>
-            <a:endParaRPr lang="en-US" sz="2800" b="0" strike="noStrike" spc="-1">
+          <a:p>
+            <a:endParaRPr b="0" lang="en-US" sz="2800" spc="-1" strike="noStrike">
               <a:solidFill>
                 <a:srgbClr val="000000"/>
               </a:solidFill>
@@ -1574,19 +1435,18 @@
         <p:spPr>
           <a:xfrm>
             <a:off x="504000" y="4058640"/>
-            <a:ext cx="9072000" cy="2090880"/>
-          </a:xfrm>
-          <a:prstGeom prst="rect">
-            <a:avLst/>
-          </a:prstGeom>
-        </p:spPr>
-        <p:txBody>
-          <a:bodyPr lIns="0" tIns="0" rIns="0" bIns="0">
+            <a:ext cx="9071640" cy="2090880"/>
+          </a:xfrm>
+          <a:prstGeom prst="rect">
+            <a:avLst/>
+          </a:prstGeom>
+        </p:spPr>
+        <p:txBody>
+          <a:bodyPr lIns="0" rIns="0" tIns="0" bIns="0">
             <a:normAutofit/>
           </a:bodyPr>
-          <a:lstStyle/>
-          <a:p>
-            <a:endParaRPr lang="en-US" sz="2800" b="0" strike="noStrike" spc="-1">
+          <a:p>
+            <a:endParaRPr b="0" lang="en-US" sz="2800" spc="-1" strike="noStrike">
               <a:solidFill>
                 <a:srgbClr val="000000"/>
               </a:solidFill>
@@ -1597,21 +1457,17 @@
       </p:sp>
     </p:spTree>
   </p:cSld>
-  <p:clrMapOvr>
-    <a:masterClrMapping/>
-  </p:clrMapOvr>
 </p:sldLayout>
 </file>
 
 <file path=ppt/slideMasters/slideMaster1.xml><?xml version="1.0" encoding="utf-8"?>
-<p:sldMaster xmlns:a="http://schemas.openxmlformats.org/drawingml/2006/main" xmlns:r="http://schemas.openxmlformats.org/officeDocument/2006/relationships" xmlns:p="http://schemas.openxmlformats.org/presentationml/2006/main">
+<p:sldMaster xmlns:a="http://schemas.openxmlformats.org/drawingml/2006/main" xmlns:p="http://schemas.openxmlformats.org/presentationml/2006/main" xmlns:r="http://schemas.openxmlformats.org/officeDocument/2006/relationships" xmlns:p14="http://schemas.microsoft.com/office/powerpoint/2010/main" xmlns:p15="http://schemas.microsoft.com/office/powerpoint/2012/main" xmlns:mc="http://schemas.openxmlformats.org/markup-compatibility/2006">
   <p:cSld>
     <p:bg>
       <p:bgPr>
         <a:solidFill>
-          <a:srgbClr val="FFFFFF"/>
+          <a:srgbClr val="ffffff"/>
         </a:solidFill>
-        <a:effectLst/>
       </p:bgPr>
     </p:bg>
     <p:spTree>
@@ -1630,7 +1486,7 @@
       </p:grpSpPr>
       <p:sp>
         <p:nvSpPr>
-          <p:cNvPr id="2" name="PlaceHolder 1"/>
+          <p:cNvPr id="0" name="PlaceHolder 1"/>
           <p:cNvSpPr>
             <a:spLocks noGrp="1"/>
           </p:cNvSpPr>
@@ -1641,18 +1497,19 @@
         <p:spPr>
           <a:xfrm>
             <a:off x="504000" y="301320"/>
-            <a:ext cx="9071280" cy="1261800"/>
-          </a:xfrm>
-          <a:prstGeom prst="rect">
-            <a:avLst/>
-          </a:prstGeom>
-        </p:spPr>
-        <p:txBody>
-          <a:bodyPr lIns="0" tIns="0" rIns="0" bIns="0" anchor="ctr"/>
-          <a:lstStyle/>
+            <a:ext cx="9070920" cy="1261440"/>
+          </a:xfrm>
+          <a:prstGeom prst="rect">
+            <a:avLst/>
+          </a:prstGeom>
+        </p:spPr>
+        <p:txBody>
+          <a:bodyPr lIns="0" rIns="0" tIns="0" bIns="0" anchor="ctr">
+            <a:noAutofit/>
+          </a:bodyPr>
           <a:p>
             <a:r>
-              <a:rPr lang="en-US" sz="4400" b="0" strike="noStrike" spc="-1">
+              <a:rPr b="0" lang="en-US" sz="4400" spc="-1" strike="noStrike">
                 <a:solidFill>
                   <a:srgbClr val="000000"/>
                 </a:solidFill>
@@ -1660,12 +1517,18 @@
               </a:rPr>
               <a:t>Click to edit the title text format</a:t>
             </a:r>
-          </a:p>
-        </p:txBody>
-      </p:sp>
-      <p:sp>
-        <p:nvSpPr>
-          <p:cNvPr id="3" name="PlaceHolder 2"/>
+            <a:endParaRPr b="0" lang="en-US" sz="4400" spc="-1" strike="noStrike">
+              <a:solidFill>
+                <a:srgbClr val="000000"/>
+              </a:solidFill>
+              <a:latin typeface="Arial"/>
+            </a:endParaRPr>
+          </a:p>
+        </p:txBody>
+      </p:sp>
+      <p:sp>
+        <p:nvSpPr>
+          <p:cNvPr id="1" name="PlaceHolder 2"/>
           <p:cNvSpPr>
             <a:spLocks noGrp="1"/>
           </p:cNvSpPr>
@@ -1676,17 +1539,16 @@
         <p:spPr>
           <a:xfrm>
             <a:off x="504000" y="1768680"/>
-            <a:ext cx="9072000" cy="4384080"/>
-          </a:xfrm>
-          <a:prstGeom prst="rect">
-            <a:avLst/>
-          </a:prstGeom>
-        </p:spPr>
-        <p:txBody>
-          <a:bodyPr lIns="0" tIns="0" rIns="0" bIns="0">
+            <a:ext cx="9071640" cy="4383720"/>
+          </a:xfrm>
+          <a:prstGeom prst="rect">
+            <a:avLst/>
+          </a:prstGeom>
+        </p:spPr>
+        <p:txBody>
+          <a:bodyPr lIns="0" rIns="0" tIns="0" bIns="0">
             <a:normAutofit/>
           </a:bodyPr>
-          <a:lstStyle/>
           <a:p>
             <a:pPr marL="432000" indent="-324000">
               <a:spcBef>
@@ -1700,7 +1562,7 @@
               <a:buChar char=""/>
             </a:pPr>
             <a:r>
-              <a:rPr lang="en-US" sz="2800" b="0" strike="noStrike" spc="-1">
+              <a:rPr b="0" lang="en-US" sz="2800" spc="-1" strike="noStrike">
                 <a:solidFill>
                   <a:srgbClr val="000000"/>
                 </a:solidFill>
@@ -1708,9 +1570,15 @@
               </a:rPr>
               <a:t>Click to edit the outline text format</a:t>
             </a:r>
-          </a:p>
-          <a:p>
-            <a:pPr marL="864000" lvl="1" indent="-324000">
+            <a:endParaRPr b="0" lang="en-US" sz="2800" spc="-1" strike="noStrike">
+              <a:solidFill>
+                <a:srgbClr val="000000"/>
+              </a:solidFill>
+              <a:latin typeface="Arial"/>
+            </a:endParaRPr>
+          </a:p>
+          <a:p>
+            <a:pPr lvl="1" marL="864000" indent="-324000">
               <a:spcBef>
                 <a:spcPts val="1134"/>
               </a:spcBef>
@@ -1722,7 +1590,7 @@
               <a:buChar char=""/>
             </a:pPr>
             <a:r>
-              <a:rPr lang="en-US" sz="2000" b="0" strike="noStrike" spc="-1">
+              <a:rPr b="0" lang="en-US" sz="2800" spc="-1" strike="noStrike">
                 <a:solidFill>
                   <a:srgbClr val="000000"/>
                 </a:solidFill>
@@ -1730,9 +1598,15 @@
               </a:rPr>
               <a:t>Second Outline Level</a:t>
             </a:r>
-          </a:p>
-          <a:p>
-            <a:pPr marL="1296000" lvl="2" indent="-288000">
+            <a:endParaRPr b="0" lang="en-US" sz="2800" spc="-1" strike="noStrike">
+              <a:solidFill>
+                <a:srgbClr val="000000"/>
+              </a:solidFill>
+              <a:latin typeface="Arial"/>
+            </a:endParaRPr>
+          </a:p>
+          <a:p>
+            <a:pPr lvl="2" marL="1296000" indent="-288000">
               <a:spcBef>
                 <a:spcPts val="850"/>
               </a:spcBef>
@@ -1744,7 +1618,7 @@
               <a:buChar char=""/>
             </a:pPr>
             <a:r>
-              <a:rPr lang="en-US" sz="1800" b="0" strike="noStrike" spc="-1">
+              <a:rPr b="0" lang="en-US" sz="2800" spc="-1" strike="noStrike">
                 <a:solidFill>
                   <a:srgbClr val="000000"/>
                 </a:solidFill>
@@ -1752,9 +1626,15 @@
               </a:rPr>
               <a:t>Third Outline Level</a:t>
             </a:r>
-          </a:p>
-          <a:p>
-            <a:pPr marL="1728000" lvl="3" indent="-216000">
+            <a:endParaRPr b="0" lang="en-US" sz="2800" spc="-1" strike="noStrike">
+              <a:solidFill>
+                <a:srgbClr val="000000"/>
+              </a:solidFill>
+              <a:latin typeface="Arial"/>
+            </a:endParaRPr>
+          </a:p>
+          <a:p>
+            <a:pPr lvl="3" marL="1728000" indent="-216000">
               <a:spcBef>
                 <a:spcPts val="567"/>
               </a:spcBef>
@@ -1766,7 +1646,7 @@
               <a:buChar char=""/>
             </a:pPr>
             <a:r>
-              <a:rPr lang="en-US" sz="1800" b="0" strike="noStrike" spc="-1">
+              <a:rPr b="0" lang="en-US" sz="2800" spc="-1" strike="noStrike">
                 <a:solidFill>
                   <a:srgbClr val="000000"/>
                 </a:solidFill>
@@ -1774,9 +1654,15 @@
               </a:rPr>
               <a:t>Fourth Outline Level</a:t>
             </a:r>
-          </a:p>
-          <a:p>
-            <a:pPr marL="2160000" lvl="4" indent="-216000">
+            <a:endParaRPr b="0" lang="en-US" sz="2800" spc="-1" strike="noStrike">
+              <a:solidFill>
+                <a:srgbClr val="000000"/>
+              </a:solidFill>
+              <a:latin typeface="Arial"/>
+            </a:endParaRPr>
+          </a:p>
+          <a:p>
+            <a:pPr lvl="4" marL="2160000" indent="-216000">
               <a:spcBef>
                 <a:spcPts val="283"/>
               </a:spcBef>
@@ -1788,7 +1674,7 @@
               <a:buChar char=""/>
             </a:pPr>
             <a:r>
-              <a:rPr lang="en-US" sz="2000" b="0" strike="noStrike" spc="-1">
+              <a:rPr b="0" lang="en-US" sz="2800" spc="-1" strike="noStrike">
                 <a:solidFill>
                   <a:srgbClr val="000000"/>
                 </a:solidFill>
@@ -1796,9 +1682,15 @@
               </a:rPr>
               <a:t>Fifth Outline Level</a:t>
             </a:r>
-          </a:p>
-          <a:p>
-            <a:pPr marL="2592000" lvl="5" indent="-216000">
+            <a:endParaRPr b="0" lang="en-US" sz="2800" spc="-1" strike="noStrike">
+              <a:solidFill>
+                <a:srgbClr val="000000"/>
+              </a:solidFill>
+              <a:latin typeface="Arial"/>
+            </a:endParaRPr>
+          </a:p>
+          <a:p>
+            <a:pPr lvl="5" marL="2592000" indent="-216000">
               <a:spcBef>
                 <a:spcPts val="283"/>
               </a:spcBef>
@@ -1810,7 +1702,7 @@
               <a:buChar char=""/>
             </a:pPr>
             <a:r>
-              <a:rPr lang="en-US" sz="2000" b="0" strike="noStrike" spc="-1">
+              <a:rPr b="0" lang="en-US" sz="2800" spc="-1" strike="noStrike">
                 <a:solidFill>
                   <a:srgbClr val="000000"/>
                 </a:solidFill>
@@ -1818,9 +1710,15 @@
               </a:rPr>
               <a:t>Sixth Outline Level</a:t>
             </a:r>
-          </a:p>
-          <a:p>
-            <a:pPr marL="3024000" lvl="6" indent="-216000">
+            <a:endParaRPr b="0" lang="en-US" sz="2800" spc="-1" strike="noStrike">
+              <a:solidFill>
+                <a:srgbClr val="000000"/>
+              </a:solidFill>
+              <a:latin typeface="Arial"/>
+            </a:endParaRPr>
+          </a:p>
+          <a:p>
+            <a:pPr lvl="6" marL="3024000" indent="-216000">
               <a:spcBef>
                 <a:spcPts val="283"/>
               </a:spcBef>
@@ -1832,7 +1730,7 @@
               <a:buChar char=""/>
             </a:pPr>
             <a:r>
-              <a:rPr lang="en-US" sz="2000" b="0" strike="noStrike" spc="-1">
+              <a:rPr b="0" lang="en-US" sz="2800" spc="-1" strike="noStrike">
                 <a:solidFill>
                   <a:srgbClr val="000000"/>
                 </a:solidFill>
@@ -1840,311 +1738,37 @@
               </a:rPr>
               <a:t>Seventh Outline Level</a:t>
             </a:r>
+            <a:endParaRPr b="0" lang="en-US" sz="2800" spc="-1" strike="noStrike">
+              <a:solidFill>
+                <a:srgbClr val="000000"/>
+              </a:solidFill>
+              <a:latin typeface="Arial"/>
+            </a:endParaRPr>
           </a:p>
         </p:txBody>
       </p:sp>
     </p:spTree>
   </p:cSld>
-  <p:clrMap bg1="lt1" tx1="dk1" bg2="lt2" tx2="dk2" accent1="accent1" accent2="accent2" accent3="accent3" accent4="accent4" accent5="accent5" accent6="accent6" hlink="hlink" folHlink="folHlink"/>
+  <p:clrMap bg1="lt1" bg2="lt2" tx1="dk1" tx2="dk2" accent1="accent1" accent2="accent2" accent3="accent3" accent4="accent4" accent5="accent5" accent6="accent6" hlink="hlink" folHlink="folHlink"/>
   <p:sldLayoutIdLst>
-    <p:sldLayoutId id="2147483649" r:id="rId1"/>
-    <p:sldLayoutId id="2147483650" r:id="rId2"/>
-    <p:sldLayoutId id="2147483651" r:id="rId3"/>
-    <p:sldLayoutId id="2147483652" r:id="rId4"/>
-    <p:sldLayoutId id="2147483653" r:id="rId5"/>
-    <p:sldLayoutId id="2147483654" r:id="rId6"/>
-    <p:sldLayoutId id="2147483655" r:id="rId7"/>
-    <p:sldLayoutId id="2147483656" r:id="rId8"/>
-    <p:sldLayoutId id="2147483657" r:id="rId9"/>
-    <p:sldLayoutId id="2147483658" r:id="rId10"/>
-    <p:sldLayoutId id="2147483659" r:id="rId11"/>
-    <p:sldLayoutId id="2147483660" r:id="rId12"/>
+    <p:sldLayoutId id="2147483649" r:id="rId2"/>
+    <p:sldLayoutId id="2147483650" r:id="rId3"/>
+    <p:sldLayoutId id="2147483651" r:id="rId4"/>
+    <p:sldLayoutId id="2147483652" r:id="rId5"/>
+    <p:sldLayoutId id="2147483653" r:id="rId6"/>
+    <p:sldLayoutId id="2147483654" r:id="rId7"/>
+    <p:sldLayoutId id="2147483655" r:id="rId8"/>
+    <p:sldLayoutId id="2147483656" r:id="rId9"/>
+    <p:sldLayoutId id="2147483657" r:id="rId10"/>
+    <p:sldLayoutId id="2147483658" r:id="rId11"/>
+    <p:sldLayoutId id="2147483659" r:id="rId12"/>
+    <p:sldLayoutId id="2147483660" r:id="rId13"/>
   </p:sldLayoutIdLst>
-  <p:txStyles>
-    <p:titleStyle>
-      <a:lvl1pPr algn="l" defTabSz="914400" rtl="0" eaLnBrk="1" latinLnBrk="0" hangingPunct="1">
-        <a:lnSpc>
-          <a:spcPct val="90000"/>
-        </a:lnSpc>
-        <a:spcBef>
-          <a:spcPct val="0"/>
-        </a:spcBef>
-        <a:buNone/>
-        <a:defRPr sz="4400" kern="1200">
-          <a:solidFill>
-            <a:schemeClr val="tx1"/>
-          </a:solidFill>
-          <a:latin typeface="+mj-lt"/>
-          <a:ea typeface="+mj-ea"/>
-          <a:cs typeface="+mj-cs"/>
-        </a:defRPr>
-      </a:lvl1pPr>
-    </p:titleStyle>
-    <p:bodyStyle>
-      <a:lvl1pPr marL="228600" indent="-228600" algn="l" defTabSz="914400" rtl="0" eaLnBrk="1" latinLnBrk="0" hangingPunct="1">
-        <a:lnSpc>
-          <a:spcPct val="90000"/>
-        </a:lnSpc>
-        <a:spcBef>
-          <a:spcPts val="1000"/>
-        </a:spcBef>
-        <a:buFont typeface="Arial" panose="020B0604020202020204" pitchFamily="34" charset="0"/>
-        <a:buChar char="•"/>
-        <a:defRPr sz="2800" kern="1200">
-          <a:solidFill>
-            <a:schemeClr val="tx1"/>
-          </a:solidFill>
-          <a:latin typeface="+mn-lt"/>
-          <a:ea typeface="+mn-ea"/>
-          <a:cs typeface="+mn-cs"/>
-        </a:defRPr>
-      </a:lvl1pPr>
-      <a:lvl2pPr marL="685800" indent="-228600" algn="l" defTabSz="914400" rtl="0" eaLnBrk="1" latinLnBrk="0" hangingPunct="1">
-        <a:lnSpc>
-          <a:spcPct val="90000"/>
-        </a:lnSpc>
-        <a:spcBef>
-          <a:spcPts val="500"/>
-        </a:spcBef>
-        <a:buFont typeface="Arial" panose="020B0604020202020204" pitchFamily="34" charset="0"/>
-        <a:buChar char="•"/>
-        <a:defRPr sz="2400" kern="1200">
-          <a:solidFill>
-            <a:schemeClr val="tx1"/>
-          </a:solidFill>
-          <a:latin typeface="+mn-lt"/>
-          <a:ea typeface="+mn-ea"/>
-          <a:cs typeface="+mn-cs"/>
-        </a:defRPr>
-      </a:lvl2pPr>
-      <a:lvl3pPr marL="1143000" indent="-228600" algn="l" defTabSz="914400" rtl="0" eaLnBrk="1" latinLnBrk="0" hangingPunct="1">
-        <a:lnSpc>
-          <a:spcPct val="90000"/>
-        </a:lnSpc>
-        <a:spcBef>
-          <a:spcPts val="500"/>
-        </a:spcBef>
-        <a:buFont typeface="Arial" panose="020B0604020202020204" pitchFamily="34" charset="0"/>
-        <a:buChar char="•"/>
-        <a:defRPr sz="2000" kern="1200">
-          <a:solidFill>
-            <a:schemeClr val="tx1"/>
-          </a:solidFill>
-          <a:latin typeface="+mn-lt"/>
-          <a:ea typeface="+mn-ea"/>
-          <a:cs typeface="+mn-cs"/>
-        </a:defRPr>
-      </a:lvl3pPr>
-      <a:lvl4pPr marL="1600200" indent="-228600" algn="l" defTabSz="914400" rtl="0" eaLnBrk="1" latinLnBrk="0" hangingPunct="1">
-        <a:lnSpc>
-          <a:spcPct val="90000"/>
-        </a:lnSpc>
-        <a:spcBef>
-          <a:spcPts val="500"/>
-        </a:spcBef>
-        <a:buFont typeface="Arial" panose="020B0604020202020204" pitchFamily="34" charset="0"/>
-        <a:buChar char="•"/>
-        <a:defRPr sz="1800" kern="1200">
-          <a:solidFill>
-            <a:schemeClr val="tx1"/>
-          </a:solidFill>
-          <a:latin typeface="+mn-lt"/>
-          <a:ea typeface="+mn-ea"/>
-          <a:cs typeface="+mn-cs"/>
-        </a:defRPr>
-      </a:lvl4pPr>
-      <a:lvl5pPr marL="2057400" indent="-228600" algn="l" defTabSz="914400" rtl="0" eaLnBrk="1" latinLnBrk="0" hangingPunct="1">
-        <a:lnSpc>
-          <a:spcPct val="90000"/>
-        </a:lnSpc>
-        <a:spcBef>
-          <a:spcPts val="500"/>
-        </a:spcBef>
-        <a:buFont typeface="Arial" panose="020B0604020202020204" pitchFamily="34" charset="0"/>
-        <a:buChar char="•"/>
-        <a:defRPr sz="1800" kern="1200">
-          <a:solidFill>
-            <a:schemeClr val="tx1"/>
-          </a:solidFill>
-          <a:latin typeface="+mn-lt"/>
-          <a:ea typeface="+mn-ea"/>
-          <a:cs typeface="+mn-cs"/>
-        </a:defRPr>
-      </a:lvl5pPr>
-      <a:lvl6pPr marL="2514600" indent="-228600" algn="l" defTabSz="914400" rtl="0" eaLnBrk="1" latinLnBrk="0" hangingPunct="1">
-        <a:lnSpc>
-          <a:spcPct val="90000"/>
-        </a:lnSpc>
-        <a:spcBef>
-          <a:spcPts val="500"/>
-        </a:spcBef>
-        <a:buFont typeface="Arial" panose="020B0604020202020204" pitchFamily="34" charset="0"/>
-        <a:buChar char="•"/>
-        <a:defRPr sz="1800" kern="1200">
-          <a:solidFill>
-            <a:schemeClr val="tx1"/>
-          </a:solidFill>
-          <a:latin typeface="+mn-lt"/>
-          <a:ea typeface="+mn-ea"/>
-          <a:cs typeface="+mn-cs"/>
-        </a:defRPr>
-      </a:lvl6pPr>
-      <a:lvl7pPr marL="2971800" indent="-228600" algn="l" defTabSz="914400" rtl="0" eaLnBrk="1" latinLnBrk="0" hangingPunct="1">
-        <a:lnSpc>
-          <a:spcPct val="90000"/>
-        </a:lnSpc>
-        <a:spcBef>
-          <a:spcPts val="500"/>
-        </a:spcBef>
-        <a:buFont typeface="Arial" panose="020B0604020202020204" pitchFamily="34" charset="0"/>
-        <a:buChar char="•"/>
-        <a:defRPr sz="1800" kern="1200">
-          <a:solidFill>
-            <a:schemeClr val="tx1"/>
-          </a:solidFill>
-          <a:latin typeface="+mn-lt"/>
-          <a:ea typeface="+mn-ea"/>
-          <a:cs typeface="+mn-cs"/>
-        </a:defRPr>
-      </a:lvl7pPr>
-      <a:lvl8pPr marL="3429000" indent="-228600" algn="l" defTabSz="914400" rtl="0" eaLnBrk="1" latinLnBrk="0" hangingPunct="1">
-        <a:lnSpc>
-          <a:spcPct val="90000"/>
-        </a:lnSpc>
-        <a:spcBef>
-          <a:spcPts val="500"/>
-        </a:spcBef>
-        <a:buFont typeface="Arial" panose="020B0604020202020204" pitchFamily="34" charset="0"/>
-        <a:buChar char="•"/>
-        <a:defRPr sz="1800" kern="1200">
-          <a:solidFill>
-            <a:schemeClr val="tx1"/>
-          </a:solidFill>
-          <a:latin typeface="+mn-lt"/>
-          <a:ea typeface="+mn-ea"/>
-          <a:cs typeface="+mn-cs"/>
-        </a:defRPr>
-      </a:lvl8pPr>
-      <a:lvl9pPr marL="3886200" indent="-228600" algn="l" defTabSz="914400" rtl="0" eaLnBrk="1" latinLnBrk="0" hangingPunct="1">
-        <a:lnSpc>
-          <a:spcPct val="90000"/>
-        </a:lnSpc>
-        <a:spcBef>
-          <a:spcPts val="500"/>
-        </a:spcBef>
-        <a:buFont typeface="Arial" panose="020B0604020202020204" pitchFamily="34" charset="0"/>
-        <a:buChar char="•"/>
-        <a:defRPr sz="1800" kern="1200">
-          <a:solidFill>
-            <a:schemeClr val="tx1"/>
-          </a:solidFill>
-          <a:latin typeface="+mn-lt"/>
-          <a:ea typeface="+mn-ea"/>
-          <a:cs typeface="+mn-cs"/>
-        </a:defRPr>
-      </a:lvl9pPr>
-    </p:bodyStyle>
-    <p:otherStyle>
-      <a:defPPr>
-        <a:defRPr lang="en-US"/>
-      </a:defPPr>
-      <a:lvl1pPr marL="0" algn="l" defTabSz="914400" rtl="0" eaLnBrk="1" latinLnBrk="0" hangingPunct="1">
-        <a:defRPr sz="1800" kern="1200">
-          <a:solidFill>
-            <a:schemeClr val="tx1"/>
-          </a:solidFill>
-          <a:latin typeface="+mn-lt"/>
-          <a:ea typeface="+mn-ea"/>
-          <a:cs typeface="+mn-cs"/>
-        </a:defRPr>
-      </a:lvl1pPr>
-      <a:lvl2pPr marL="457200" algn="l" defTabSz="914400" rtl="0" eaLnBrk="1" latinLnBrk="0" hangingPunct="1">
-        <a:defRPr sz="1800" kern="1200">
-          <a:solidFill>
-            <a:schemeClr val="tx1"/>
-          </a:solidFill>
-          <a:latin typeface="+mn-lt"/>
-          <a:ea typeface="+mn-ea"/>
-          <a:cs typeface="+mn-cs"/>
-        </a:defRPr>
-      </a:lvl2pPr>
-      <a:lvl3pPr marL="914400" algn="l" defTabSz="914400" rtl="0" eaLnBrk="1" latinLnBrk="0" hangingPunct="1">
-        <a:defRPr sz="1800" kern="1200">
-          <a:solidFill>
-            <a:schemeClr val="tx1"/>
-          </a:solidFill>
-          <a:latin typeface="+mn-lt"/>
-          <a:ea typeface="+mn-ea"/>
-          <a:cs typeface="+mn-cs"/>
-        </a:defRPr>
-      </a:lvl3pPr>
-      <a:lvl4pPr marL="1371600" algn="l" defTabSz="914400" rtl="0" eaLnBrk="1" latinLnBrk="0" hangingPunct="1">
-        <a:defRPr sz="1800" kern="1200">
-          <a:solidFill>
-            <a:schemeClr val="tx1"/>
-          </a:solidFill>
-          <a:latin typeface="+mn-lt"/>
-          <a:ea typeface="+mn-ea"/>
-          <a:cs typeface="+mn-cs"/>
-        </a:defRPr>
-      </a:lvl4pPr>
-      <a:lvl5pPr marL="1828800" algn="l" defTabSz="914400" rtl="0" eaLnBrk="1" latinLnBrk="0" hangingPunct="1">
-        <a:defRPr sz="1800" kern="1200">
-          <a:solidFill>
-            <a:schemeClr val="tx1"/>
-          </a:solidFill>
-          <a:latin typeface="+mn-lt"/>
-          <a:ea typeface="+mn-ea"/>
-          <a:cs typeface="+mn-cs"/>
-        </a:defRPr>
-      </a:lvl5pPr>
-      <a:lvl6pPr marL="2286000" algn="l" defTabSz="914400" rtl="0" eaLnBrk="1" latinLnBrk="0" hangingPunct="1">
-        <a:defRPr sz="1800" kern="1200">
-          <a:solidFill>
-            <a:schemeClr val="tx1"/>
-          </a:solidFill>
-          <a:latin typeface="+mn-lt"/>
-          <a:ea typeface="+mn-ea"/>
-          <a:cs typeface="+mn-cs"/>
-        </a:defRPr>
-      </a:lvl6pPr>
-      <a:lvl7pPr marL="2743200" algn="l" defTabSz="914400" rtl="0" eaLnBrk="1" latinLnBrk="0" hangingPunct="1">
-        <a:defRPr sz="1800" kern="1200">
-          <a:solidFill>
-            <a:schemeClr val="tx1"/>
-          </a:solidFill>
-          <a:latin typeface="+mn-lt"/>
-          <a:ea typeface="+mn-ea"/>
-          <a:cs typeface="+mn-cs"/>
-        </a:defRPr>
-      </a:lvl7pPr>
-      <a:lvl8pPr marL="3200400" algn="l" defTabSz="914400" rtl="0" eaLnBrk="1" latinLnBrk="0" hangingPunct="1">
-        <a:defRPr sz="1800" kern="1200">
-          <a:solidFill>
-            <a:schemeClr val="tx1"/>
-          </a:solidFill>
-          <a:latin typeface="+mn-lt"/>
-          <a:ea typeface="+mn-ea"/>
-          <a:cs typeface="+mn-cs"/>
-        </a:defRPr>
-      </a:lvl8pPr>
-      <a:lvl9pPr marL="3657600" algn="l" defTabSz="914400" rtl="0" eaLnBrk="1" latinLnBrk="0" hangingPunct="1">
-        <a:defRPr sz="1800" kern="1200">
-          <a:solidFill>
-            <a:schemeClr val="tx1"/>
-          </a:solidFill>
-          <a:latin typeface="+mn-lt"/>
-          <a:ea typeface="+mn-ea"/>
-          <a:cs typeface="+mn-cs"/>
-        </a:defRPr>
-      </a:lvl9pPr>
-    </p:otherStyle>
-  </p:txStyles>
 </p:sldMaster>
 </file>
 
 <file path=ppt/slides/slide1.xml><?xml version="1.0" encoding="utf-8"?>
-<p:sld xmlns:a="http://schemas.openxmlformats.org/drawingml/2006/main" xmlns:r="http://schemas.openxmlformats.org/officeDocument/2006/relationships" xmlns:p="http://schemas.openxmlformats.org/presentationml/2006/main">
+<p:sld xmlns:a="http://schemas.openxmlformats.org/drawingml/2006/main" xmlns:p="http://schemas.openxmlformats.org/presentationml/2006/main" xmlns:r="http://schemas.openxmlformats.org/officeDocument/2006/relationships" xmlns:p14="http://schemas.microsoft.com/office/powerpoint/2010/main" xmlns:p15="http://schemas.microsoft.com/office/powerpoint/2012/main" xmlns:mc="http://schemas.openxmlformats.org/markup-compatibility/2006">
   <p:cSld>
     <p:spTree>
       <p:nvGrpSpPr>
@@ -2162,18 +1786,46 @@
       </p:grpSpPr>
       <p:grpSp>
         <p:nvGrpSpPr>
-          <p:cNvPr id="39" name="Group 2"/>
+          <p:cNvPr id="38" name="Group 1"/>
           <p:cNvGrpSpPr/>
           <p:nvPr/>
         </p:nvGrpSpPr>
         <p:grpSpPr>
           <a:xfrm>
             <a:off x="109800" y="1828800"/>
-            <a:ext cx="1446120" cy="731520"/>
+            <a:ext cx="1445760" cy="731160"/>
             <a:chOff x="109800" y="1828800"/>
-            <a:chExt cx="1446120" cy="731520"/>
+            <a:chExt cx="1445760" cy="731160"/>
           </a:xfrm>
         </p:grpSpPr>
+        <p:sp>
+          <p:nvSpPr>
+            <p:cNvPr id="39" name="CustomShape 2"/>
+            <p:cNvSpPr/>
+            <p:nvPr/>
+          </p:nvSpPr>
+          <p:spPr>
+            <a:xfrm>
+              <a:off x="109800" y="1828800"/>
+              <a:ext cx="1420920" cy="731160"/>
+            </a:xfrm>
+            <a:prstGeom prst="ellipse">
+              <a:avLst/>
+            </a:prstGeom>
+            <a:solidFill>
+              <a:srgbClr val="cccccc"/>
+            </a:solidFill>
+            <a:ln>
+              <a:noFill/>
+            </a:ln>
+          </p:spPr>
+          <p:style>
+            <a:lnRef idx="0"/>
+            <a:fillRef idx="0"/>
+            <a:effectRef idx="0"/>
+            <a:fontRef idx="minor"/>
+          </p:style>
+        </p:sp>
         <p:sp>
           <p:nvSpPr>
             <p:cNvPr id="40" name="CustomShape 3"/>
@@ -2182,40 +1834,8 @@
           </p:nvSpPr>
           <p:spPr>
             <a:xfrm>
-              <a:off x="109800" y="1828800"/>
-              <a:ext cx="1421280" cy="731520"/>
-            </a:xfrm>
-            <a:prstGeom prst="ellipse">
-              <a:avLst/>
-            </a:prstGeom>
-            <a:solidFill>
-              <a:srgbClr val="CCCCCC"/>
-            </a:solidFill>
-            <a:ln/>
-          </p:spPr>
-          <p:style>
-            <a:lnRef idx="0">
-              <a:scrgbClr r="0" g="0" b="0"/>
-            </a:lnRef>
-            <a:fillRef idx="0">
-              <a:scrgbClr r="0" g="0" b="0"/>
-            </a:fillRef>
-            <a:effectRef idx="0">
-              <a:scrgbClr r="0" g="0" b="0"/>
-            </a:effectRef>
-            <a:fontRef idx="minor"/>
-          </p:style>
-        </p:sp>
-        <p:sp>
-          <p:nvSpPr>
-            <p:cNvPr id="41" name="CustomShape 4"/>
-            <p:cNvSpPr/>
-            <p:nvPr/>
-          </p:nvSpPr>
-          <p:spPr>
-            <a:xfrm>
               <a:off x="168480" y="2067120"/>
-              <a:ext cx="1387440" cy="315720"/>
+              <a:ext cx="1387080" cy="315360"/>
             </a:xfrm>
             <a:prstGeom prst="rect">
               <a:avLst/>
@@ -2226,20 +1846,15 @@
             </a:ln>
           </p:spPr>
           <p:style>
-            <a:lnRef idx="0">
-              <a:scrgbClr r="0" g="0" b="0"/>
-            </a:lnRef>
-            <a:fillRef idx="0">
-              <a:scrgbClr r="0" g="0" b="0"/>
-            </a:fillRef>
-            <a:effectRef idx="0">
-              <a:scrgbClr r="0" g="0" b="0"/>
-            </a:effectRef>
+            <a:lnRef idx="0"/>
+            <a:fillRef idx="0"/>
+            <a:effectRef idx="0"/>
             <a:fontRef idx="minor"/>
           </p:style>
           <p:txBody>
-            <a:bodyPr lIns="90000" tIns="45000" rIns="90000" bIns="45000"/>
-            <a:lstStyle/>
+            <a:bodyPr lIns="90000" rIns="90000" tIns="45000" bIns="45000">
+              <a:noAutofit/>
+            </a:bodyPr>
             <a:p>
               <a:pPr>
                 <a:lnSpc>
@@ -2247,16 +1862,26 @@
                 </a:lnSpc>
               </a:pPr>
               <a:r>
-                <a:rPr lang="en-US" sz="1400" b="0" strike="noStrike" spc="-1" dirty="0" smtClean="0">
+                <a:rPr b="0" lang="en-US" sz="1400" spc="-1" strike="noStrike">
                   <a:solidFill>
                     <a:srgbClr val="000000"/>
                   </a:solidFill>
                   <a:latin typeface="Arial"/>
                   <a:ea typeface="DejaVu Sans"/>
                 </a:rPr>
-                <a:t>    Receiver</a:t>
+                <a:t>    </a:t>
               </a:r>
-              <a:endParaRPr lang="en-US" sz="1400" b="0" strike="noStrike" spc="-1" dirty="0">
+              <a:r>
+                <a:rPr b="0" lang="en-US" sz="1400" spc="-1" strike="noStrike">
+                  <a:solidFill>
+                    <a:srgbClr val="000000"/>
+                  </a:solidFill>
+                  <a:latin typeface="Arial"/>
+                  <a:ea typeface="DejaVu Sans"/>
+                </a:rPr>
+                <a:t>Receiver</a:t>
+              </a:r>
+              <a:endParaRPr b="0" lang="en-US" sz="1400" spc="-1" strike="noStrike">
                 <a:latin typeface="Arial"/>
               </a:endParaRPr>
             </a:p>
@@ -2265,18 +1890,46 @@
       </p:grpSp>
       <p:grpSp>
         <p:nvGrpSpPr>
-          <p:cNvPr id="42" name="Group 5"/>
+          <p:cNvPr id="41" name="Group 4"/>
           <p:cNvGrpSpPr/>
           <p:nvPr/>
         </p:nvGrpSpPr>
         <p:grpSpPr>
           <a:xfrm>
             <a:off x="1938600" y="1975680"/>
-            <a:ext cx="1384920" cy="456840"/>
+            <a:ext cx="1384560" cy="456480"/>
             <a:chOff x="1938600" y="1975680"/>
-            <a:chExt cx="1384920" cy="456840"/>
+            <a:chExt cx="1384560" cy="456480"/>
           </a:xfrm>
         </p:grpSpPr>
+        <p:sp>
+          <p:nvSpPr>
+            <p:cNvPr id="42" name="CustomShape 5"/>
+            <p:cNvSpPr/>
+            <p:nvPr/>
+          </p:nvSpPr>
+          <p:spPr>
+            <a:xfrm>
+              <a:off x="1938600" y="1975680"/>
+              <a:ext cx="1384560" cy="456480"/>
+            </a:xfrm>
+            <a:prstGeom prst="rect">
+              <a:avLst/>
+            </a:prstGeom>
+            <a:solidFill>
+              <a:srgbClr val="ff6600"/>
+            </a:solidFill>
+            <a:ln>
+              <a:noFill/>
+            </a:ln>
+          </p:spPr>
+          <p:style>
+            <a:lnRef idx="0"/>
+            <a:fillRef idx="0"/>
+            <a:effectRef idx="0"/>
+            <a:fontRef idx="minor"/>
+          </p:style>
+        </p:sp>
         <p:sp>
           <p:nvSpPr>
             <p:cNvPr id="43" name="CustomShape 6"/>
@@ -2285,40 +1938,8 @@
           </p:nvSpPr>
           <p:spPr>
             <a:xfrm>
-              <a:off x="1938600" y="1975680"/>
-              <a:ext cx="1384920" cy="456840"/>
-            </a:xfrm>
-            <a:prstGeom prst="rect">
-              <a:avLst/>
-            </a:prstGeom>
-            <a:solidFill>
-              <a:srgbClr val="FF6600"/>
-            </a:solidFill>
-            <a:ln/>
-          </p:spPr>
-          <p:style>
-            <a:lnRef idx="0">
-              <a:scrgbClr r="0" g="0" b="0"/>
-            </a:lnRef>
-            <a:fillRef idx="0">
-              <a:scrgbClr r="0" g="0" b="0"/>
-            </a:fillRef>
-            <a:effectRef idx="0">
-              <a:scrgbClr r="0" g="0" b="0"/>
-            </a:effectRef>
-            <a:fontRef idx="minor"/>
-          </p:style>
-        </p:sp>
-        <p:sp>
-          <p:nvSpPr>
-            <p:cNvPr id="44" name="CustomShape 7"/>
-            <p:cNvSpPr/>
-            <p:nvPr/>
-          </p:nvSpPr>
-          <p:spPr>
-            <a:xfrm>
               <a:off x="2076840" y="2067120"/>
-              <a:ext cx="1049040" cy="315720"/>
+              <a:ext cx="1048680" cy="315360"/>
             </a:xfrm>
             <a:prstGeom prst="rect">
               <a:avLst/>
@@ -2329,20 +1950,15 @@
             </a:ln>
           </p:spPr>
           <p:style>
-            <a:lnRef idx="0">
-              <a:scrgbClr r="0" g="0" b="0"/>
-            </a:lnRef>
-            <a:fillRef idx="0">
-              <a:scrgbClr r="0" g="0" b="0"/>
-            </a:fillRef>
-            <a:effectRef idx="0">
-              <a:scrgbClr r="0" g="0" b="0"/>
-            </a:effectRef>
+            <a:lnRef idx="0"/>
+            <a:fillRef idx="0"/>
+            <a:effectRef idx="0"/>
             <a:fontRef idx="minor"/>
           </p:style>
           <p:txBody>
-            <a:bodyPr lIns="90000" tIns="45000" rIns="90000" bIns="45000"/>
-            <a:lstStyle/>
+            <a:bodyPr lIns="90000" rIns="90000" tIns="45000" bIns="45000">
+              <a:noAutofit/>
+            </a:bodyPr>
             <a:p>
               <a:pPr>
                 <a:lnSpc>
@@ -2350,16 +1966,26 @@
                 </a:lnSpc>
               </a:pPr>
               <a:r>
-                <a:rPr lang="en-US" sz="1400" b="0" strike="noStrike" spc="-1">
+                <a:rPr b="0" lang="en-US" sz="1400" spc="-1" strike="noStrike">
                   <a:solidFill>
                     <a:srgbClr val="000000"/>
                   </a:solidFill>
                   <a:latin typeface="Arial"/>
                   <a:ea typeface="DejaVu Sans"/>
                 </a:rPr>
-                <a:t>  Demands</a:t>
+                <a:t>  </a:t>
               </a:r>
-              <a:endParaRPr lang="en-US" sz="1400" b="0" strike="noStrike" spc="-1">
+              <a:r>
+                <a:rPr b="0" lang="en-US" sz="1400" spc="-1" strike="noStrike">
+                  <a:solidFill>
+                    <a:srgbClr val="000000"/>
+                  </a:solidFill>
+                  <a:latin typeface="Arial"/>
+                  <a:ea typeface="DejaVu Sans"/>
+                </a:rPr>
+                <a:t>Demands</a:t>
+              </a:r>
+              <a:endParaRPr b="0" lang="en-US" sz="1400" spc="-1" strike="noStrike">
                 <a:latin typeface="Arial"/>
               </a:endParaRPr>
             </a:p>
@@ -2368,46 +1994,42 @@
       </p:grpSp>
       <p:sp>
         <p:nvSpPr>
+          <p:cNvPr id="44" name="CustomShape 7"/>
+          <p:cNvSpPr/>
+          <p:nvPr/>
+        </p:nvSpPr>
+        <p:spPr>
+          <a:xfrm>
+            <a:off x="2251800" y="3520440"/>
+            <a:ext cx="1384560" cy="456480"/>
+          </a:xfrm>
+          <a:prstGeom prst="rect">
+            <a:avLst/>
+          </a:prstGeom>
+          <a:solidFill>
+            <a:srgbClr val="66ff00"/>
+          </a:solidFill>
+          <a:ln>
+            <a:noFill/>
+          </a:ln>
+        </p:spPr>
+        <p:style>
+          <a:lnRef idx="0"/>
+          <a:fillRef idx="0"/>
+          <a:effectRef idx="0"/>
+          <a:fontRef idx="minor"/>
+        </p:style>
+      </p:sp>
+      <p:sp>
+        <p:nvSpPr>
           <p:cNvPr id="45" name="CustomShape 8"/>
           <p:cNvSpPr/>
           <p:nvPr/>
         </p:nvSpPr>
         <p:spPr>
           <a:xfrm>
-            <a:off x="2251800" y="3520440"/>
-            <a:ext cx="1384920" cy="456840"/>
-          </a:xfrm>
-          <a:prstGeom prst="rect">
-            <a:avLst/>
-          </a:prstGeom>
-          <a:solidFill>
-            <a:srgbClr val="66FF00"/>
-          </a:solidFill>
-          <a:ln/>
-        </p:spPr>
-        <p:style>
-          <a:lnRef idx="0">
-            <a:scrgbClr r="0" g="0" b="0"/>
-          </a:lnRef>
-          <a:fillRef idx="0">
-            <a:scrgbClr r="0" g="0" b="0"/>
-          </a:fillRef>
-          <a:effectRef idx="0">
-            <a:scrgbClr r="0" g="0" b="0"/>
-          </a:effectRef>
-          <a:fontRef idx="minor"/>
-        </p:style>
-      </p:sp>
-      <p:sp>
-        <p:nvSpPr>
-          <p:cNvPr id="46" name="CustomShape 9"/>
-          <p:cNvSpPr/>
-          <p:nvPr/>
-        </p:nvSpPr>
-        <p:spPr>
-          <a:xfrm>
             <a:off x="2570040" y="3566160"/>
-            <a:ext cx="654480" cy="315720"/>
+            <a:ext cx="654120" cy="315360"/>
           </a:xfrm>
           <a:prstGeom prst="rect">
             <a:avLst/>
@@ -2418,20 +2040,15 @@
           </a:ln>
         </p:spPr>
         <p:style>
-          <a:lnRef idx="0">
-            <a:scrgbClr r="0" g="0" b="0"/>
-          </a:lnRef>
-          <a:fillRef idx="0">
-            <a:scrgbClr r="0" g="0" b="0"/>
-          </a:fillRef>
-          <a:effectRef idx="0">
-            <a:scrgbClr r="0" g="0" b="0"/>
-          </a:effectRef>
+          <a:lnRef idx="0"/>
+          <a:fillRef idx="0"/>
+          <a:effectRef idx="0"/>
           <a:fontRef idx="minor"/>
         </p:style>
         <p:txBody>
-          <a:bodyPr lIns="90000" tIns="45000" rIns="90000" bIns="45000"/>
-          <a:lstStyle/>
+          <a:bodyPr lIns="90000" rIns="90000" tIns="45000" bIns="45000">
+            <a:noAutofit/>
+          </a:bodyPr>
           <a:p>
             <a:pPr>
               <a:lnSpc>
@@ -2439,7 +2056,7 @@
               </a:lnSpc>
             </a:pPr>
             <a:r>
-              <a:rPr lang="en-US" sz="1400" b="0" strike="noStrike" spc="-1">
+              <a:rPr b="0" lang="en-US" sz="1400" spc="-1" strike="noStrike">
                 <a:solidFill>
                   <a:srgbClr val="000000"/>
                 </a:solidFill>
@@ -2448,7 +2065,7 @@
               </a:rPr>
               <a:t>State</a:t>
             </a:r>
-            <a:endParaRPr lang="en-US" sz="1400" b="0" strike="noStrike" spc="-1">
+            <a:endParaRPr b="0" lang="en-US" sz="1400" spc="-1" strike="noStrike">
               <a:latin typeface="Arial"/>
             </a:endParaRPr>
           </a:p>
@@ -2456,18 +2073,46 @@
       </p:sp>
       <p:grpSp>
         <p:nvGrpSpPr>
-          <p:cNvPr id="47" name="Group 10"/>
+          <p:cNvPr id="46" name="Group 9"/>
           <p:cNvGrpSpPr/>
           <p:nvPr/>
         </p:nvGrpSpPr>
         <p:grpSpPr>
           <a:xfrm>
             <a:off x="5607000" y="2688840"/>
-            <a:ext cx="1187280" cy="456840"/>
+            <a:ext cx="1186920" cy="456480"/>
             <a:chOff x="5607000" y="2688840"/>
-            <a:chExt cx="1187280" cy="456840"/>
+            <a:chExt cx="1186920" cy="456480"/>
           </a:xfrm>
         </p:grpSpPr>
+        <p:sp>
+          <p:nvSpPr>
+            <p:cNvPr id="47" name="CustomShape 10"/>
+            <p:cNvSpPr/>
+            <p:nvPr/>
+          </p:nvSpPr>
+          <p:spPr>
+            <a:xfrm>
+              <a:off x="5607000" y="2688840"/>
+              <a:ext cx="1186920" cy="456480"/>
+            </a:xfrm>
+            <a:prstGeom prst="rect">
+              <a:avLst/>
+            </a:prstGeom>
+            <a:solidFill>
+              <a:srgbClr val="ff6600"/>
+            </a:solidFill>
+            <a:ln>
+              <a:noFill/>
+            </a:ln>
+          </p:spPr>
+          <p:style>
+            <a:lnRef idx="0"/>
+            <a:fillRef idx="0"/>
+            <a:effectRef idx="0"/>
+            <a:fontRef idx="minor"/>
+          </p:style>
+        </p:sp>
         <p:sp>
           <p:nvSpPr>
             <p:cNvPr id="48" name="CustomShape 11"/>
@@ -2476,40 +2121,8 @@
           </p:nvSpPr>
           <p:spPr>
             <a:xfrm>
-              <a:off x="5607000" y="2688840"/>
-              <a:ext cx="1187280" cy="456840"/>
-            </a:xfrm>
-            <a:prstGeom prst="rect">
-              <a:avLst/>
-            </a:prstGeom>
-            <a:solidFill>
-              <a:srgbClr val="FF6600"/>
-            </a:solidFill>
-            <a:ln/>
-          </p:spPr>
-          <p:style>
-            <a:lnRef idx="0">
-              <a:scrgbClr r="0" g="0" b="0"/>
-            </a:lnRef>
-            <a:fillRef idx="0">
-              <a:scrgbClr r="0" g="0" b="0"/>
-            </a:fillRef>
-            <a:effectRef idx="0">
-              <a:scrgbClr r="0" g="0" b="0"/>
-            </a:effectRef>
-            <a:fontRef idx="minor"/>
-          </p:style>
-        </p:sp>
-        <p:sp>
-          <p:nvSpPr>
-            <p:cNvPr id="49" name="CustomShape 12"/>
-            <p:cNvSpPr/>
-            <p:nvPr/>
-          </p:nvSpPr>
-          <p:spPr>
-            <a:xfrm>
               <a:off x="5745240" y="2780280"/>
-              <a:ext cx="1049040" cy="315720"/>
+              <a:ext cx="1048680" cy="315360"/>
             </a:xfrm>
             <a:prstGeom prst="rect">
               <a:avLst/>
@@ -2520,20 +2133,15 @@
             </a:ln>
           </p:spPr>
           <p:style>
-            <a:lnRef idx="0">
-              <a:scrgbClr r="0" g="0" b="0"/>
-            </a:lnRef>
-            <a:fillRef idx="0">
-              <a:scrgbClr r="0" g="0" b="0"/>
-            </a:fillRef>
-            <a:effectRef idx="0">
-              <a:scrgbClr r="0" g="0" b="0"/>
-            </a:effectRef>
+            <a:lnRef idx="0"/>
+            <a:fillRef idx="0"/>
+            <a:effectRef idx="0"/>
             <a:fontRef idx="minor"/>
           </p:style>
           <p:txBody>
-            <a:bodyPr lIns="90000" tIns="45000" rIns="90000" bIns="45000"/>
-            <a:lstStyle/>
+            <a:bodyPr lIns="90000" rIns="90000" tIns="45000" bIns="45000">
+              <a:noAutofit/>
+            </a:bodyPr>
             <a:p>
               <a:pPr>
                 <a:lnSpc>
@@ -2541,7 +2149,7 @@
                 </a:lnSpc>
               </a:pPr>
               <a:r>
-                <a:rPr lang="en-US" sz="1400" b="0" strike="noStrike" spc="-1">
+                <a:rPr b="0" lang="en-US" sz="1400" spc="-1" strike="noStrike">
                   <a:solidFill>
                     <a:srgbClr val="000000"/>
                   </a:solidFill>
@@ -2550,7 +2158,7 @@
                 </a:rPr>
                 <a:t>Demands</a:t>
               </a:r>
-              <a:endParaRPr lang="en-US" sz="1400" b="0" strike="noStrike" spc="-1">
+              <a:endParaRPr b="0" lang="en-US" sz="1400" spc="-1" strike="noStrike">
                 <a:latin typeface="Arial"/>
               </a:endParaRPr>
             </a:p>
@@ -2559,46 +2167,42 @@
       </p:grpSp>
       <p:sp>
         <p:nvSpPr>
+          <p:cNvPr id="49" name="CustomShape 12"/>
+          <p:cNvSpPr/>
+          <p:nvPr/>
+        </p:nvSpPr>
+        <p:spPr>
+          <a:xfrm>
+            <a:off x="7236360" y="2612880"/>
+            <a:ext cx="1204920" cy="587160"/>
+          </a:xfrm>
+          <a:prstGeom prst="ellipse">
+            <a:avLst/>
+          </a:prstGeom>
+          <a:solidFill>
+            <a:srgbClr val="729fcf"/>
+          </a:solidFill>
+          <a:ln>
+            <a:noFill/>
+          </a:ln>
+        </p:spPr>
+        <p:style>
+          <a:lnRef idx="0"/>
+          <a:fillRef idx="0"/>
+          <a:effectRef idx="0"/>
+          <a:fontRef idx="minor"/>
+        </p:style>
+      </p:sp>
+      <p:sp>
+        <p:nvSpPr>
           <p:cNvPr id="50" name="CustomShape 13"/>
           <p:cNvSpPr/>
           <p:nvPr/>
         </p:nvSpPr>
         <p:spPr>
           <a:xfrm>
-            <a:off x="7236360" y="2612880"/>
-            <a:ext cx="1205280" cy="587520"/>
-          </a:xfrm>
-          <a:prstGeom prst="ellipse">
-            <a:avLst/>
-          </a:prstGeom>
-          <a:solidFill>
-            <a:srgbClr val="729FCF"/>
-          </a:solidFill>
-          <a:ln/>
-        </p:spPr>
-        <p:style>
-          <a:lnRef idx="0">
-            <a:scrgbClr r="0" g="0" b="0"/>
-          </a:lnRef>
-          <a:fillRef idx="0">
-            <a:scrgbClr r="0" g="0" b="0"/>
-          </a:fillRef>
-          <a:effectRef idx="0">
-            <a:scrgbClr r="0" g="0" b="0"/>
-          </a:effectRef>
-          <a:fontRef idx="minor"/>
-        </p:style>
-      </p:sp>
-      <p:sp>
-        <p:nvSpPr>
-          <p:cNvPr id="51" name="CustomShape 14"/>
-          <p:cNvSpPr/>
-          <p:nvPr/>
-        </p:nvSpPr>
-        <p:spPr>
-          <a:xfrm>
             <a:off x="7521120" y="2762640"/>
-            <a:ext cx="626400" cy="289800"/>
+            <a:ext cx="626040" cy="289440"/>
           </a:xfrm>
           <a:prstGeom prst="rect">
             <a:avLst/>
@@ -2609,20 +2213,15 @@
           </a:ln>
         </p:spPr>
         <p:style>
-          <a:lnRef idx="0">
-            <a:scrgbClr r="0" g="0" b="0"/>
-          </a:lnRef>
-          <a:fillRef idx="0">
-            <a:scrgbClr r="0" g="0" b="0"/>
-          </a:fillRef>
-          <a:effectRef idx="0">
-            <a:scrgbClr r="0" g="0" b="0"/>
-          </a:effectRef>
+          <a:lnRef idx="0"/>
+          <a:fillRef idx="0"/>
+          <a:effectRef idx="0"/>
           <a:fontRef idx="minor"/>
         </p:style>
         <p:txBody>
-          <a:bodyPr lIns="90000" tIns="45000" rIns="90000" bIns="45000"/>
-          <a:lstStyle/>
+          <a:bodyPr lIns="90000" rIns="90000" tIns="45000" bIns="45000">
+            <a:noAutofit/>
+          </a:bodyPr>
           <a:p>
             <a:pPr>
               <a:lnSpc>
@@ -2630,7 +2229,7 @@
               </a:lnSpc>
             </a:pPr>
             <a:r>
-              <a:rPr lang="en-US" sz="1400" b="0" strike="noStrike" spc="-1" dirty="0">
+              <a:rPr b="0" lang="en-US" sz="1400" spc="-1" strike="noStrike">
                 <a:solidFill>
                   <a:srgbClr val="000000"/>
                 </a:solidFill>
@@ -2639,11 +2238,39 @@
               </a:rPr>
               <a:t>Mixer</a:t>
             </a:r>
-            <a:endParaRPr lang="en-US" sz="1400" b="0" strike="noStrike" spc="-1" dirty="0">
-              <a:latin typeface="Arial"/>
-            </a:endParaRPr>
-          </a:p>
-        </p:txBody>
+            <a:endParaRPr b="0" lang="en-US" sz="1400" spc="-1" strike="noStrike">
+              <a:latin typeface="Arial"/>
+            </a:endParaRPr>
+          </a:p>
+        </p:txBody>
+      </p:sp>
+      <p:sp>
+        <p:nvSpPr>
+          <p:cNvPr id="51" name="CustomShape 14"/>
+          <p:cNvSpPr/>
+          <p:nvPr/>
+        </p:nvSpPr>
+        <p:spPr>
+          <a:xfrm>
+            <a:off x="3869640" y="2551320"/>
+            <a:ext cx="1463040" cy="730800"/>
+          </a:xfrm>
+          <a:prstGeom prst="ellipse">
+            <a:avLst/>
+          </a:prstGeom>
+          <a:solidFill>
+            <a:srgbClr val="cccccc"/>
+          </a:solidFill>
+          <a:ln>
+            <a:noFill/>
+          </a:ln>
+        </p:spPr>
+        <p:style>
+          <a:lnRef idx="0"/>
+          <a:fillRef idx="0"/>
+          <a:effectRef idx="0"/>
+          <a:fontRef idx="minor"/>
+        </p:style>
       </p:sp>
       <p:sp>
         <p:nvSpPr>
@@ -2653,40 +2280,8 @@
         </p:nvSpPr>
         <p:spPr>
           <a:xfrm>
-            <a:off x="3869640" y="2551320"/>
-            <a:ext cx="1463400" cy="731160"/>
-          </a:xfrm>
-          <a:prstGeom prst="ellipse">
-            <a:avLst/>
-          </a:prstGeom>
-          <a:solidFill>
-            <a:srgbClr val="CCCCCC"/>
-          </a:solidFill>
-          <a:ln/>
-        </p:spPr>
-        <p:style>
-          <a:lnRef idx="0">
-            <a:scrgbClr r="0" g="0" b="0"/>
-          </a:lnRef>
-          <a:fillRef idx="0">
-            <a:scrgbClr r="0" g="0" b="0"/>
-          </a:fillRef>
-          <a:effectRef idx="0">
-            <a:scrgbClr r="0" g="0" b="0"/>
-          </a:effectRef>
-          <a:fontRef idx="minor"/>
-        </p:style>
-      </p:sp>
-      <p:sp>
-        <p:nvSpPr>
-          <p:cNvPr id="53" name="CustomShape 16"/>
-          <p:cNvSpPr/>
-          <p:nvPr/>
-        </p:nvSpPr>
-        <p:spPr>
-          <a:xfrm>
             <a:off x="3889080" y="2632680"/>
-            <a:ext cx="1465920" cy="315720"/>
+            <a:ext cx="1465560" cy="315360"/>
           </a:xfrm>
           <a:prstGeom prst="rect">
             <a:avLst/>
@@ -2697,20 +2292,15 @@
           </a:ln>
         </p:spPr>
         <p:style>
-          <a:lnRef idx="0">
-            <a:scrgbClr r="0" g="0" b="0"/>
-          </a:lnRef>
-          <a:fillRef idx="0">
-            <a:scrgbClr r="0" g="0" b="0"/>
-          </a:fillRef>
-          <a:effectRef idx="0">
-            <a:scrgbClr r="0" g="0" b="0"/>
-          </a:effectRef>
+          <a:lnRef idx="0"/>
+          <a:fillRef idx="0"/>
+          <a:effectRef idx="0"/>
           <a:fontRef idx="minor"/>
         </p:style>
         <p:txBody>
-          <a:bodyPr lIns="90000" tIns="45000" rIns="90000" bIns="45000"/>
-          <a:lstStyle/>
+          <a:bodyPr lIns="90000" rIns="90000" tIns="45000" bIns="45000">
+            <a:noAutofit/>
+          </a:bodyPr>
           <a:p>
             <a:pPr algn="ctr">
               <a:lnSpc>
@@ -2718,7 +2308,7 @@
               </a:lnSpc>
             </a:pPr>
             <a:r>
-              <a:rPr lang="en-US" sz="1500" b="0" strike="noStrike" spc="-1">
+              <a:rPr b="0" lang="en-US" sz="1500" spc="-1" strike="noStrike">
                 <a:solidFill>
                   <a:srgbClr val="000000"/>
                 </a:solidFill>
@@ -2727,7 +2317,7 @@
               </a:rPr>
               <a:t>PID </a:t>
             </a:r>
-            <a:endParaRPr lang="en-US" sz="1500" b="0" strike="noStrike" spc="-1">
+            <a:endParaRPr b="0" lang="en-US" sz="1500" spc="-1" strike="noStrike">
               <a:latin typeface="Arial"/>
             </a:endParaRPr>
           </a:p>
@@ -2738,7 +2328,7 @@
               </a:lnSpc>
             </a:pPr>
             <a:r>
-              <a:rPr lang="en-US" sz="1500" b="0" strike="noStrike" spc="-1">
+              <a:rPr b="0" lang="en-US" sz="1500" spc="-1" strike="noStrike">
                 <a:solidFill>
                   <a:srgbClr val="000000"/>
                 </a:solidFill>
@@ -2747,7 +2337,7 @@
               </a:rPr>
               <a:t>Controllers</a:t>
             </a:r>
-            <a:endParaRPr lang="en-US" sz="1500" b="0" strike="noStrike" spc="-1">
+            <a:endParaRPr b="0" lang="en-US" sz="1500" spc="-1" strike="noStrike">
               <a:latin typeface="Arial"/>
             </a:endParaRPr>
           </a:p>
@@ -2755,60 +2345,56 @@
       </p:sp>
       <p:grpSp>
         <p:nvGrpSpPr>
-          <p:cNvPr id="56" name="Group 19"/>
+          <p:cNvPr id="53" name="Group 16"/>
           <p:cNvGrpSpPr/>
           <p:nvPr/>
         </p:nvGrpSpPr>
         <p:grpSpPr>
           <a:xfrm>
             <a:off x="54360" y="3200400"/>
-            <a:ext cx="1737360" cy="1097280"/>
+            <a:ext cx="1737000" cy="1096920"/>
             <a:chOff x="54360" y="3200400"/>
-            <a:chExt cx="1737360" cy="1097280"/>
+            <a:chExt cx="1737000" cy="1096920"/>
           </a:xfrm>
         </p:grpSpPr>
         <p:sp>
           <p:nvSpPr>
-            <p:cNvPr id="57" name="CustomShape 20"/>
+            <p:cNvPr id="54" name="CustomShape 17"/>
             <p:cNvSpPr/>
             <p:nvPr/>
           </p:nvSpPr>
           <p:spPr>
             <a:xfrm>
               <a:off x="54360" y="3200400"/>
-              <a:ext cx="1737360" cy="1097280"/>
+              <a:ext cx="1737000" cy="1096920"/>
             </a:xfrm>
             <a:prstGeom prst="ellipse">
               <a:avLst/>
             </a:prstGeom>
             <a:solidFill>
-              <a:srgbClr val="CCCCCC"/>
+              <a:srgbClr val="cccccc"/>
             </a:solidFill>
-            <a:ln/>
+            <a:ln>
+              <a:noFill/>
+            </a:ln>
           </p:spPr>
           <p:style>
-            <a:lnRef idx="0">
-              <a:scrgbClr r="0" g="0" b="0"/>
-            </a:lnRef>
-            <a:fillRef idx="0">
-              <a:scrgbClr r="0" g="0" b="0"/>
-            </a:fillRef>
-            <a:effectRef idx="0">
-              <a:scrgbClr r="0" g="0" b="0"/>
-            </a:effectRef>
+            <a:lnRef idx="0"/>
+            <a:fillRef idx="0"/>
+            <a:effectRef idx="0"/>
             <a:fontRef idx="minor"/>
           </p:style>
         </p:sp>
         <p:sp>
           <p:nvSpPr>
-            <p:cNvPr id="58" name="CustomShape 21"/>
+            <p:cNvPr id="55" name="CustomShape 18"/>
             <p:cNvSpPr/>
             <p:nvPr/>
           </p:nvSpPr>
           <p:spPr>
             <a:xfrm>
               <a:off x="439920" y="3350160"/>
-              <a:ext cx="925560" cy="315720"/>
+              <a:ext cx="925200" cy="315360"/>
             </a:xfrm>
             <a:prstGeom prst="rect">
               <a:avLst/>
@@ -2819,20 +2405,15 @@
             </a:ln>
           </p:spPr>
           <p:style>
-            <a:lnRef idx="0">
-              <a:scrgbClr r="0" g="0" b="0"/>
-            </a:lnRef>
-            <a:fillRef idx="0">
-              <a:scrgbClr r="0" g="0" b="0"/>
-            </a:fillRef>
-            <a:effectRef idx="0">
-              <a:scrgbClr r="0" g="0" b="0"/>
-            </a:effectRef>
+            <a:lnRef idx="0"/>
+            <a:fillRef idx="0"/>
+            <a:effectRef idx="0"/>
             <a:fontRef idx="minor"/>
           </p:style>
           <p:txBody>
-            <a:bodyPr lIns="90000" tIns="45000" rIns="90000" bIns="45000"/>
-            <a:lstStyle/>
+            <a:bodyPr lIns="90000" rIns="90000" tIns="45000" bIns="45000">
+              <a:noAutofit/>
+            </a:bodyPr>
             <a:p>
               <a:pPr>
                 <a:lnSpc>
@@ -2840,7 +2421,7 @@
                 </a:lnSpc>
               </a:pPr>
               <a:r>
-                <a:rPr lang="en-US" sz="1400" b="0" strike="noStrike" spc="-1">
+                <a:rPr b="0" lang="en-US" sz="1400" spc="-1" strike="noStrike">
                   <a:solidFill>
                     <a:srgbClr val="000000"/>
                   </a:solidFill>
@@ -2849,7 +2430,7 @@
                 </a:rPr>
                 <a:t>Sensors</a:t>
               </a:r>
-              <a:endParaRPr lang="en-US" sz="1400" b="0" strike="noStrike" spc="-1">
+              <a:endParaRPr b="0" lang="en-US" sz="1400" spc="-1" strike="noStrike">
                 <a:latin typeface="Arial"/>
               </a:endParaRPr>
             </a:p>
@@ -2857,60 +2438,56 @@
         </p:sp>
         <p:grpSp>
           <p:nvGrpSpPr>
-            <p:cNvPr id="59" name="Group 22"/>
+            <p:cNvPr id="56" name="Group 19"/>
             <p:cNvGrpSpPr/>
             <p:nvPr/>
           </p:nvGrpSpPr>
           <p:grpSpPr>
             <a:xfrm>
               <a:off x="506880" y="3693600"/>
-              <a:ext cx="785880" cy="421200"/>
+              <a:ext cx="785520" cy="420840"/>
               <a:chOff x="506880" y="3693600"/>
-              <a:chExt cx="785880" cy="421200"/>
+              <a:chExt cx="785520" cy="420840"/>
             </a:xfrm>
           </p:grpSpPr>
           <p:sp>
             <p:nvSpPr>
-              <p:cNvPr id="60" name="CustomShape 23"/>
+              <p:cNvPr id="57" name="CustomShape 20"/>
               <p:cNvSpPr/>
               <p:nvPr/>
             </p:nvSpPr>
             <p:spPr>
               <a:xfrm>
                 <a:off x="506880" y="3693600"/>
-                <a:ext cx="785880" cy="421200"/>
+                <a:ext cx="785520" cy="420840"/>
               </a:xfrm>
               <a:prstGeom prst="ellipse">
                 <a:avLst/>
               </a:prstGeom>
               <a:solidFill>
-                <a:srgbClr val="729FCF"/>
-              </a:solidFill>
-              <a:ln/>
+                <a:srgbClr val="729fcf"/>
+              </a:solidFill>
+              <a:ln>
+                <a:noFill/>
+              </a:ln>
             </p:spPr>
             <p:style>
-              <a:lnRef idx="0">
-                <a:scrgbClr r="0" g="0" b="0"/>
-              </a:lnRef>
-              <a:fillRef idx="0">
-                <a:scrgbClr r="0" g="0" b="0"/>
-              </a:fillRef>
-              <a:effectRef idx="0">
-                <a:scrgbClr r="0" g="0" b="0"/>
-              </a:effectRef>
+              <a:lnRef idx="0"/>
+              <a:fillRef idx="0"/>
+              <a:effectRef idx="0"/>
               <a:fontRef idx="minor"/>
             </p:style>
           </p:sp>
           <p:sp>
             <p:nvSpPr>
-              <p:cNvPr id="61" name="CustomShape 24"/>
+              <p:cNvPr id="58" name="CustomShape 21"/>
               <p:cNvSpPr/>
               <p:nvPr/>
             </p:nvSpPr>
             <p:spPr>
               <a:xfrm>
                 <a:off x="624600" y="3755520"/>
-                <a:ext cx="529200" cy="291240"/>
+                <a:ext cx="528840" cy="290880"/>
               </a:xfrm>
               <a:prstGeom prst="rect">
                 <a:avLst/>
@@ -2921,20 +2498,15 @@
               </a:ln>
             </p:spPr>
             <p:style>
-              <a:lnRef idx="0">
-                <a:scrgbClr r="0" g="0" b="0"/>
-              </a:lnRef>
-              <a:fillRef idx="0">
-                <a:scrgbClr r="0" g="0" b="0"/>
-              </a:fillRef>
-              <a:effectRef idx="0">
-                <a:scrgbClr r="0" g="0" b="0"/>
-              </a:effectRef>
+              <a:lnRef idx="0"/>
+              <a:fillRef idx="0"/>
+              <a:effectRef idx="0"/>
               <a:fontRef idx="minor"/>
             </p:style>
             <p:txBody>
-              <a:bodyPr lIns="90000" tIns="45000" rIns="90000" bIns="45000"/>
-              <a:lstStyle/>
+              <a:bodyPr lIns="90000" rIns="90000" tIns="45000" bIns="45000">
+                <a:noAutofit/>
+              </a:bodyPr>
               <a:p>
                 <a:pPr>
                   <a:lnSpc>
@@ -2942,7 +2514,7 @@
                   </a:lnSpc>
                 </a:pPr>
                 <a:r>
-                  <a:rPr lang="en-US" sz="1400" b="0" strike="noStrike" spc="-1">
+                  <a:rPr b="0" lang="en-US" sz="1400" spc="-1" strike="noStrike">
                     <a:solidFill>
                       <a:srgbClr val="000000"/>
                     </a:solidFill>
@@ -2951,7 +2523,7 @@
                   </a:rPr>
                   <a:t>IMU</a:t>
                 </a:r>
-                <a:endParaRPr lang="en-US" sz="1400" b="0" strike="noStrike" spc="-1">
+                <a:endParaRPr b="0" lang="en-US" sz="1400" spc="-1" strike="noStrike">
                   <a:latin typeface="Arial"/>
                 </a:endParaRPr>
               </a:p>
@@ -2959,193 +2531,296 @@
           </p:sp>
         </p:grpSp>
       </p:grpSp>
-      <p:cxnSp>
-        <p:nvCxnSpPr>
-          <p:cNvPr id="62" name="Line 25"/>
-          <p:cNvCxnSpPr>
-            <a:stCxn id="56" idx="3"/>
-            <a:endCxn id="45" idx="1"/>
-          </p:cNvCxnSpPr>
+      <p:sp>
+        <p:nvSpPr>
+          <p:cNvPr id="59" name="CustomShape 22"/>
+          <p:cNvSpPr/>
           <p:nvPr/>
-        </p:nvCxnSpPr>
+        </p:nvSpPr>
         <p:spPr>
           <a:xfrm flipV="1">
-            <a:off x="1791720" y="3748680"/>
-            <a:ext cx="460440" cy="720"/>
-          </a:xfrm>
-          <a:prstGeom prst="straightConnector1">
-            <a:avLst/>
-          </a:prstGeom>
+            <a:off x="1791720" y="3747960"/>
+            <a:ext cx="460080" cy="360"/>
+          </a:xfrm>
+          <a:custGeom>
+            <a:avLst/>
+            <a:gdLst/>
+            <a:ahLst/>
+            <a:rect l="l" t="t" r="r" b="b"/>
+            <a:pathLst>
+              <a:path w="21600" h="21600">
+                <a:moveTo>
+                  <a:pt x="0" y="0"/>
+                </a:moveTo>
+                <a:lnTo>
+                  <a:pt x="21600" y="21600"/>
+                </a:lnTo>
+              </a:path>
+            </a:pathLst>
+          </a:custGeom>
+          <a:noFill/>
           <a:ln>
             <a:solidFill>
               <a:srgbClr val="000000"/>
             </a:solidFill>
-            <a:tailEnd type="triangle" w="med" len="med"/>
+            <a:tailEnd len="med" type="triangle" w="med"/>
           </a:ln>
         </p:spPr>
-      </p:cxnSp>
-      <p:cxnSp>
-        <p:nvCxnSpPr>
-          <p:cNvPr id="63" name="Line 26"/>
-          <p:cNvCxnSpPr>
-            <a:stCxn id="39" idx="3"/>
-            <a:endCxn id="43" idx="1"/>
-          </p:cNvCxnSpPr>
+        <p:style>
+          <a:lnRef idx="0"/>
+          <a:fillRef idx="0"/>
+          <a:effectRef idx="0"/>
+          <a:fontRef idx="minor"/>
+        </p:style>
+      </p:sp>
+      <p:sp>
+        <p:nvSpPr>
+          <p:cNvPr id="60" name="CustomShape 23"/>
+          <p:cNvSpPr/>
           <p:nvPr/>
-        </p:nvCxnSpPr>
+        </p:nvSpPr>
         <p:spPr>
           <a:xfrm>
             <a:off x="1555920" y="2194560"/>
-            <a:ext cx="383040" cy="9720"/>
-          </a:xfrm>
-          <a:prstGeom prst="straightConnector1">
-            <a:avLst/>
-          </a:prstGeom>
+            <a:ext cx="382680" cy="9360"/>
+          </a:xfrm>
+          <a:custGeom>
+            <a:avLst/>
+            <a:gdLst/>
+            <a:ahLst/>
+            <a:rect l="l" t="t" r="r" b="b"/>
+            <a:pathLst>
+              <a:path w="21600" h="21600">
+                <a:moveTo>
+                  <a:pt x="0" y="0"/>
+                </a:moveTo>
+                <a:lnTo>
+                  <a:pt x="21600" y="21600"/>
+                </a:lnTo>
+              </a:path>
+            </a:pathLst>
+          </a:custGeom>
+          <a:noFill/>
           <a:ln>
             <a:solidFill>
               <a:srgbClr val="000000"/>
             </a:solidFill>
-            <a:tailEnd type="triangle" w="med" len="med"/>
+            <a:tailEnd len="med" type="triangle" w="med"/>
           </a:ln>
         </p:spPr>
-      </p:cxnSp>
-      <p:cxnSp>
-        <p:nvCxnSpPr>
-          <p:cNvPr id="64" name="Line 27"/>
-          <p:cNvCxnSpPr>
-            <a:stCxn id="42" idx="3"/>
-          </p:cNvCxnSpPr>
+        <p:style>
+          <a:lnRef idx="0"/>
+          <a:fillRef idx="0"/>
+          <a:effectRef idx="0"/>
+          <a:fontRef idx="minor"/>
+        </p:style>
+      </p:sp>
+      <p:sp>
+        <p:nvSpPr>
+          <p:cNvPr id="61" name="CustomShape 24"/>
+          <p:cNvSpPr/>
           <p:nvPr/>
-        </p:nvCxnSpPr>
+        </p:nvSpPr>
         <p:spPr>
           <a:xfrm>
             <a:off x="3323520" y="2203920"/>
-            <a:ext cx="544680" cy="719640"/>
-          </a:xfrm>
-          <a:prstGeom prst="straightConnector1">
-            <a:avLst/>
-          </a:prstGeom>
+            <a:ext cx="544320" cy="719280"/>
+          </a:xfrm>
+          <a:custGeom>
+            <a:avLst/>
+            <a:gdLst/>
+            <a:ahLst/>
+            <a:rect l="l" t="t" r="r" b="b"/>
+            <a:pathLst>
+              <a:path w="21600" h="21600">
+                <a:moveTo>
+                  <a:pt x="0" y="0"/>
+                </a:moveTo>
+                <a:lnTo>
+                  <a:pt x="21600" y="21600"/>
+                </a:lnTo>
+              </a:path>
+            </a:pathLst>
+          </a:custGeom>
+          <a:noFill/>
           <a:ln>
             <a:solidFill>
               <a:srgbClr val="000000"/>
             </a:solidFill>
-            <a:tailEnd type="triangle" w="med" len="med"/>
+            <a:tailEnd len="med" type="triangle" w="med"/>
           </a:ln>
         </p:spPr>
-      </p:cxnSp>
-      <p:cxnSp>
-        <p:nvCxnSpPr>
-          <p:cNvPr id="66" name="Line 29"/>
-          <p:cNvCxnSpPr>
-            <a:stCxn id="45" idx="3"/>
-          </p:cNvCxnSpPr>
+        <p:style>
+          <a:lnRef idx="0"/>
+          <a:fillRef idx="0"/>
+          <a:effectRef idx="0"/>
+          <a:fontRef idx="minor"/>
+        </p:style>
+      </p:sp>
+      <p:sp>
+        <p:nvSpPr>
+          <p:cNvPr id="62" name="CustomShape 25"/>
+          <p:cNvSpPr/>
           <p:nvPr/>
-        </p:nvCxnSpPr>
+        </p:nvSpPr>
         <p:spPr>
           <a:xfrm flipV="1">
-            <a:off x="3636720" y="2923200"/>
-            <a:ext cx="231480" cy="825840"/>
-          </a:xfrm>
-          <a:prstGeom prst="straightConnector1">
-            <a:avLst/>
-          </a:prstGeom>
+            <a:off x="3636720" y="2922480"/>
+            <a:ext cx="231120" cy="825480"/>
+          </a:xfrm>
+          <a:custGeom>
+            <a:avLst/>
+            <a:gdLst/>
+            <a:ahLst/>
+            <a:rect l="l" t="t" r="r" b="b"/>
+            <a:pathLst>
+              <a:path w="21600" h="21600">
+                <a:moveTo>
+                  <a:pt x="0" y="0"/>
+                </a:moveTo>
+                <a:lnTo>
+                  <a:pt x="21600" y="21600"/>
+                </a:lnTo>
+              </a:path>
+            </a:pathLst>
+          </a:custGeom>
+          <a:noFill/>
           <a:ln>
             <a:solidFill>
               <a:srgbClr val="000000"/>
             </a:solidFill>
-            <a:tailEnd type="triangle" w="med" len="med"/>
+            <a:tailEnd len="med" type="triangle" w="med"/>
           </a:ln>
         </p:spPr>
-      </p:cxnSp>
-      <p:cxnSp>
-        <p:nvCxnSpPr>
-          <p:cNvPr id="67" name="Line 30"/>
-          <p:cNvCxnSpPr>
-            <a:stCxn id="52" idx="3"/>
-            <a:endCxn id="47" idx="1"/>
-          </p:cNvCxnSpPr>
+        <p:style>
+          <a:lnRef idx="0"/>
+          <a:fillRef idx="0"/>
+          <a:effectRef idx="0"/>
+          <a:fontRef idx="minor"/>
+        </p:style>
+      </p:sp>
+      <p:sp>
+        <p:nvSpPr>
+          <p:cNvPr id="63" name="CustomShape 26"/>
+          <p:cNvSpPr/>
           <p:nvPr/>
-        </p:nvCxnSpPr>
+        </p:nvSpPr>
         <p:spPr>
           <a:xfrm>
             <a:off x="5333040" y="2916720"/>
-            <a:ext cx="274320" cy="720"/>
-          </a:xfrm>
-          <a:prstGeom prst="straightConnector1">
-            <a:avLst/>
-          </a:prstGeom>
+            <a:ext cx="273960" cy="360"/>
+          </a:xfrm>
+          <a:custGeom>
+            <a:avLst/>
+            <a:gdLst/>
+            <a:ahLst/>
+            <a:rect l="l" t="t" r="r" b="b"/>
+            <a:pathLst>
+              <a:path w="21600" h="21600">
+                <a:moveTo>
+                  <a:pt x="0" y="0"/>
+                </a:moveTo>
+                <a:lnTo>
+                  <a:pt x="21600" y="21600"/>
+                </a:lnTo>
+              </a:path>
+            </a:pathLst>
+          </a:custGeom>
+          <a:noFill/>
           <a:ln>
             <a:solidFill>
               <a:srgbClr val="000000"/>
             </a:solidFill>
-            <a:tailEnd type="triangle" w="med" len="med"/>
+            <a:tailEnd len="med" type="triangle" w="med"/>
           </a:ln>
         </p:spPr>
-      </p:cxnSp>
-      <p:cxnSp>
-        <p:nvCxnSpPr>
-          <p:cNvPr id="68" name="Line 31"/>
-          <p:cNvCxnSpPr/>
+        <p:style>
+          <a:lnRef idx="0"/>
+          <a:fillRef idx="0"/>
+          <a:effectRef idx="0"/>
+          <a:fontRef idx="minor"/>
+        </p:style>
+      </p:sp>
+      <p:sp>
+        <p:nvSpPr>
+          <p:cNvPr id="64" name="CustomShape 27"/>
+          <p:cNvSpPr/>
           <p:nvPr/>
-        </p:nvCxnSpPr>
+        </p:nvSpPr>
         <p:spPr>
           <a:xfrm flipV="1">
-            <a:off x="6818658" y="2904959"/>
-            <a:ext cx="276120" cy="3960"/>
-          </a:xfrm>
-          <a:prstGeom prst="straightConnector1">
-            <a:avLst/>
-          </a:prstGeom>
+            <a:off x="6818760" y="2904840"/>
+            <a:ext cx="275760" cy="3600"/>
+          </a:xfrm>
+          <a:custGeom>
+            <a:avLst/>
+            <a:gdLst/>
+            <a:ahLst/>
+            <a:rect l="l" t="t" r="r" b="b"/>
+            <a:pathLst>
+              <a:path w="21600" h="21600">
+                <a:moveTo>
+                  <a:pt x="0" y="0"/>
+                </a:moveTo>
+                <a:lnTo>
+                  <a:pt x="21600" y="21600"/>
+                </a:lnTo>
+              </a:path>
+            </a:pathLst>
+          </a:custGeom>
+          <a:noFill/>
           <a:ln>
             <a:solidFill>
               <a:srgbClr val="000000"/>
             </a:solidFill>
-            <a:tailEnd type="triangle" w="med" len="med"/>
+            <a:tailEnd len="med" type="triangle" w="med"/>
           </a:ln>
         </p:spPr>
-      </p:cxnSp>
-      <p:sp>
-        <p:nvSpPr>
-          <p:cNvPr id="70" name="CustomShape 33"/>
+        <p:style>
+          <a:lnRef idx="0"/>
+          <a:fillRef idx="0"/>
+          <a:effectRef idx="0"/>
+          <a:fontRef idx="minor"/>
+        </p:style>
+      </p:sp>
+      <p:sp>
+        <p:nvSpPr>
+          <p:cNvPr id="65" name="CustomShape 28"/>
           <p:cNvSpPr/>
           <p:nvPr/>
         </p:nvSpPr>
         <p:spPr>
           <a:xfrm>
             <a:off x="8828280" y="2671560"/>
-            <a:ext cx="987840" cy="456840"/>
+            <a:ext cx="987480" cy="456480"/>
           </a:xfrm>
           <a:prstGeom prst="rect">
             <a:avLst/>
           </a:prstGeom>
           <a:solidFill>
-            <a:srgbClr val="729FCF"/>
+            <a:srgbClr val="729fcf"/>
           </a:solidFill>
-          <a:ln/>
+          <a:ln>
+            <a:noFill/>
+          </a:ln>
         </p:spPr>
         <p:style>
-          <a:lnRef idx="0">
-            <a:scrgbClr r="0" g="0" b="0"/>
-          </a:lnRef>
-          <a:fillRef idx="0">
-            <a:scrgbClr r="0" g="0" b="0"/>
-          </a:fillRef>
-          <a:effectRef idx="0">
-            <a:scrgbClr r="0" g="0" b="0"/>
-          </a:effectRef>
+          <a:lnRef idx="0"/>
+          <a:fillRef idx="0"/>
+          <a:effectRef idx="0"/>
           <a:fontRef idx="minor"/>
         </p:style>
       </p:sp>
       <p:sp>
         <p:nvSpPr>
-          <p:cNvPr id="71" name="CustomShape 34"/>
+          <p:cNvPr id="66" name="CustomShape 29"/>
           <p:cNvSpPr/>
           <p:nvPr/>
         </p:nvSpPr>
         <p:spPr>
           <a:xfrm>
             <a:off x="8975160" y="2763000"/>
-            <a:ext cx="840960" cy="315720"/>
+            <a:ext cx="840600" cy="315360"/>
           </a:xfrm>
           <a:prstGeom prst="rect">
             <a:avLst/>
@@ -3156,20 +2831,15 @@
           </a:ln>
         </p:spPr>
         <p:style>
-          <a:lnRef idx="0">
-            <a:scrgbClr r="0" g="0" b="0"/>
-          </a:lnRef>
-          <a:fillRef idx="0">
-            <a:scrgbClr r="0" g="0" b="0"/>
-          </a:fillRef>
-          <a:effectRef idx="0">
-            <a:scrgbClr r="0" g="0" b="0"/>
-          </a:effectRef>
+          <a:lnRef idx="0"/>
+          <a:fillRef idx="0"/>
+          <a:effectRef idx="0"/>
           <a:fontRef idx="minor"/>
         </p:style>
         <p:txBody>
-          <a:bodyPr lIns="90000" tIns="45000" rIns="90000" bIns="45000"/>
-          <a:lstStyle/>
+          <a:bodyPr lIns="90000" rIns="90000" tIns="45000" bIns="45000">
+            <a:noAutofit/>
+          </a:bodyPr>
           <a:p>
             <a:pPr>
               <a:lnSpc>
@@ -3177,7 +2847,7 @@
               </a:lnSpc>
             </a:pPr>
             <a:r>
-              <a:rPr lang="en-US" sz="1400" b="0" strike="noStrike" spc="-1">
+              <a:rPr b="0" lang="en-US" sz="1400" spc="-1" strike="noStrike">
                 <a:solidFill>
                   <a:srgbClr val="000000"/>
                 </a:solidFill>
@@ -3186,144 +2856,64 @@
               </a:rPr>
               <a:t>Motors</a:t>
             </a:r>
-            <a:endParaRPr lang="en-US" sz="1400" b="0" strike="noStrike" spc="-1">
-              <a:latin typeface="Arial"/>
-            </a:endParaRPr>
-          </a:p>
-        </p:txBody>
-      </p:sp>
-      <p:cxnSp>
-        <p:nvCxnSpPr>
-          <p:cNvPr id="72" name="Line 35"/>
-          <p:cNvCxnSpPr>
-            <a:endCxn id="70" idx="1"/>
-          </p:cNvCxnSpPr>
+            <a:endParaRPr b="0" lang="en-US" sz="1400" spc="-1" strike="noStrike">
+              <a:latin typeface="Arial"/>
+            </a:endParaRPr>
+          </a:p>
+        </p:txBody>
+      </p:sp>
+      <p:sp>
+        <p:nvSpPr>
+          <p:cNvPr id="67" name="CustomShape 30"/>
+          <p:cNvSpPr/>
           <p:nvPr/>
-        </p:nvCxnSpPr>
+        </p:nvSpPr>
         <p:spPr>
           <a:xfrm flipV="1">
-            <a:off x="8441640" y="2899800"/>
-            <a:ext cx="387000" cy="7200"/>
-          </a:xfrm>
-          <a:prstGeom prst="straightConnector1">
-            <a:avLst/>
-          </a:prstGeom>
+            <a:off x="8441640" y="2899080"/>
+            <a:ext cx="386640" cy="6840"/>
+          </a:xfrm>
+          <a:custGeom>
+            <a:avLst/>
+            <a:gdLst/>
+            <a:ahLst/>
+            <a:rect l="l" t="t" r="r" b="b"/>
+            <a:pathLst>
+              <a:path w="21600" h="21600">
+                <a:moveTo>
+                  <a:pt x="0" y="0"/>
+                </a:moveTo>
+                <a:lnTo>
+                  <a:pt x="21600" y="21600"/>
+                </a:lnTo>
+              </a:path>
+            </a:pathLst>
+          </a:custGeom>
+          <a:noFill/>
           <a:ln>
             <a:solidFill>
               <a:srgbClr val="000000"/>
             </a:solidFill>
-            <a:tailEnd type="triangle" w="med" len="med"/>
+            <a:tailEnd len="med" type="triangle" w="med"/>
           </a:ln>
         </p:spPr>
-      </p:cxnSp>
-      <p:cxnSp>
-        <p:nvCxnSpPr>
-          <p:cNvPr id="4" name="Curved Connector 3"/>
-          <p:cNvCxnSpPr>
-            <a:stCxn id="71" idx="2"/>
-            <a:endCxn id="45" idx="2"/>
-          </p:cNvCxnSpPr>
-          <p:nvPr/>
-        </p:nvCxnSpPr>
-        <p:spPr>
-          <a:xfrm rot="5400000">
-            <a:off x="5720670" y="302310"/>
-            <a:ext cx="898560" cy="6451380"/>
-          </a:xfrm>
-          <a:prstGeom prst="curvedConnector3">
-            <a:avLst>
-              <a:gd name="adj1" fmla="val 211844"/>
-            </a:avLst>
-          </a:prstGeom>
-          <a:ln>
-            <a:tailEnd type="triangle"/>
-          </a:ln>
-        </p:spPr>
         <p:style>
-          <a:lnRef idx="1">
-            <a:schemeClr val="dk1"/>
-          </a:lnRef>
-          <a:fillRef idx="0">
-            <a:schemeClr val="dk1"/>
-          </a:fillRef>
-          <a:effectRef idx="0">
-            <a:schemeClr val="dk1"/>
-          </a:effectRef>
-          <a:fontRef idx="minor">
-            <a:schemeClr val="tx1"/>
-          </a:fontRef>
+          <a:lnRef idx="0"/>
+          <a:fillRef idx="0"/>
+          <a:effectRef idx="0"/>
+          <a:fontRef idx="minor"/>
         </p:style>
-      </p:cxnSp>
-      <p:cxnSp>
-        <p:nvCxnSpPr>
-          <p:cNvPr id="74" name="Curved Connector 73"/>
-          <p:cNvCxnSpPr>
-            <a:stCxn id="45" idx="2"/>
-            <a:endCxn id="57" idx="4"/>
-          </p:cNvCxnSpPr>
-          <p:nvPr/>
-        </p:nvCxnSpPr>
-        <p:spPr>
-          <a:xfrm rot="5400000">
-            <a:off x="1773450" y="3126870"/>
-            <a:ext cx="320400" cy="2021220"/>
-          </a:xfrm>
-          <a:prstGeom prst="curvedConnector3">
-            <a:avLst>
-              <a:gd name="adj1" fmla="val 297890"/>
-            </a:avLst>
-          </a:prstGeom>
-          <a:ln>
-            <a:tailEnd type="triangle"/>
-          </a:ln>
-        </p:spPr>
-        <p:style>
-          <a:lnRef idx="1">
-            <a:schemeClr val="dk1"/>
-          </a:lnRef>
-          <a:fillRef idx="0">
-            <a:schemeClr val="dk1"/>
-          </a:fillRef>
-          <a:effectRef idx="0">
-            <a:schemeClr val="dk1"/>
-          </a:effectRef>
-          <a:fontRef idx="minor">
-            <a:schemeClr val="tx1"/>
-          </a:fontRef>
-        </p:style>
-      </p:cxnSp>
+      </p:sp>
     </p:spTree>
   </p:cSld>
-  <p:clrMapOvr>
-    <a:masterClrMapping/>
-  </p:clrMapOvr>
-  <p:timing>
-    <p:tnLst>
-      <p:par>
-        <p:cTn id="1" dur="indefinite" restart="never" nodeType="tmRoot">
-          <p:childTnLst>
-            <p:seq>
-              <p:cTn id="2" dur="indefinite" nodeType="mainSeq"/>
-              <p:prevCondLst>
-                <p:cond evt="onPrev" delay="0">
-                  <p:tgtEl>
-                    <p:sldTgt/>
-                  </p:tgtEl>
-                </p:cond>
-              </p:prevCondLst>
-              <p:nextCondLst>
-                <p:cond evt="onNext" delay="0">
-                  <p:tgtEl>
-                    <p:sldTgt/>
-                  </p:tgtEl>
-                </p:cond>
-              </p:nextCondLst>
-            </p:seq>
-          </p:childTnLst>
-        </p:cTn>
-      </p:par>
-    </p:tnLst>
-  </p:timing>
+  <mc:AlternateContent>
+    <mc:Choice Requires="p14">
+      <p:transition spd="slow" p14:dur="2000"/>
+    </mc:Choice>
+    <mc:Fallback>
+      <p:transition spd="slow"/>
+    </mc:Fallback>
+  </mc:AlternateContent>
 </p:sld>
 </file>
 
@@ -3338,31 +2928,31 @@
         <a:sysClr val="window" lastClr="FFFFFF"/>
       </a:lt1>
       <a:dk2>
-        <a:srgbClr val="1F497D"/>
+        <a:srgbClr val="1f497d"/>
       </a:dk2>
       <a:lt2>
-        <a:srgbClr val="EEECE1"/>
+        <a:srgbClr val="eeece1"/>
       </a:lt2>
       <a:accent1>
-        <a:srgbClr val="4F81BD"/>
+        <a:srgbClr val="4f81bd"/>
       </a:accent1>
       <a:accent2>
-        <a:srgbClr val="C0504D"/>
+        <a:srgbClr val="c0504d"/>
       </a:accent2>
       <a:accent3>
-        <a:srgbClr val="9BBB59"/>
+        <a:srgbClr val="9bbb59"/>
       </a:accent3>
       <a:accent4>
-        <a:srgbClr val="8064A2"/>
+        <a:srgbClr val="8064a2"/>
       </a:accent4>
       <a:accent5>
-        <a:srgbClr val="4BACC6"/>
+        <a:srgbClr val="4bacc6"/>
       </a:accent5>
       <a:accent6>
-        <a:srgbClr val="F79646"/>
+        <a:srgbClr val="f79646"/>
       </a:accent6>
       <a:hlink>
-        <a:srgbClr val="0000FF"/>
+        <a:srgbClr val="0000ff"/>
       </a:hlink>
       <a:folHlink>
         <a:srgbClr val="800080"/>
@@ -3441,18 +3031,21 @@
             </a:schemeClr>
           </a:solidFill>
           <a:prstDash val="solid"/>
+          <a:miter/>
         </a:ln>
         <a:ln w="25400" cap="flat" cmpd="sng" algn="ctr">
           <a:solidFill>
             <a:schemeClr val="phClr"/>
           </a:solidFill>
           <a:prstDash val="solid"/>
+          <a:miter/>
         </a:ln>
         <a:ln w="38100" cap="flat" cmpd="sng" algn="ctr">
           <a:solidFill>
             <a:schemeClr val="phClr"/>
           </a:solidFill>
           <a:prstDash val="solid"/>
+          <a:miter/>
         </a:ln>
       </a:lnStyleLst>
       <a:effectStyleLst>
@@ -3547,7 +3140,5 @@
       </a:bgFillStyleLst>
     </a:fmtScheme>
   </a:themeElements>
-  <a:objectDefaults/>
-  <a:extraClrSchemeLst/>
 </a:theme>
 </file>
</xml_diff>

<commit_message>
Show core in dataflow diagram
</commit_message>
<xml_diff>
--- a/media/dataflow.pptx
+++ b/media/dataflow.pptx
@@ -197,7 +197,7 @@
           <a:p>
             <a:fld id="{294320AA-ABA5-4E48-AA42-16F4DECCBD16}" type="datetimeFigureOut">
               <a:rPr lang="en-US" smtClean="0"/>
-              <a:t>8/28/2022</a:t>
+              <a:t>12/14/2022</a:t>
             </a:fld>
             <a:endParaRPr lang="en-US"/>
           </a:p>
@@ -2628,6 +2628,55 @@
           <a:chExt cx="0" cy="0"/>
         </a:xfrm>
       </p:grpSpPr>
+      <p:sp>
+        <p:nvSpPr>
+          <p:cNvPr id="2" name="Rectangle 1"/>
+          <p:cNvSpPr/>
+          <p:nvPr/>
+        </p:nvSpPr>
+        <p:spPr>
+          <a:xfrm>
+            <a:off x="2039437" y="1411705"/>
+            <a:ext cx="6679446" cy="3023937"/>
+          </a:xfrm>
+          <a:prstGeom prst="rect">
+            <a:avLst/>
+          </a:prstGeom>
+          <a:solidFill>
+            <a:schemeClr val="bg2">
+              <a:lumMod val="90000"/>
+              <a:alpha val="40000"/>
+            </a:schemeClr>
+          </a:solidFill>
+          <a:ln w="22225">
+            <a:noFill/>
+          </a:ln>
+        </p:spPr>
+        <p:style>
+          <a:lnRef idx="2">
+            <a:schemeClr val="accent1">
+              <a:shade val="50000"/>
+            </a:schemeClr>
+          </a:lnRef>
+          <a:fillRef idx="1">
+            <a:schemeClr val="accent1"/>
+          </a:fillRef>
+          <a:effectRef idx="0">
+            <a:schemeClr val="accent1"/>
+          </a:effectRef>
+          <a:fontRef idx="minor">
+            <a:schemeClr val="lt1"/>
+          </a:fontRef>
+        </p:style>
+        <p:txBody>
+          <a:bodyPr rtlCol="0" anchor="ctr"/>
+          <a:lstStyle/>
+          <a:p>
+            <a:pPr algn="ctr"/>
+            <a:endParaRPr lang="en-US"/>
+          </a:p>
+        </p:txBody>
+      </p:sp>
       <p:grpSp>
         <p:nvGrpSpPr>
           <p:cNvPr id="38" name="Group 1"/>
@@ -2636,7 +2685,7 @@
         </p:nvGrpSpPr>
         <p:grpSpPr>
           <a:xfrm>
-            <a:off x="186000" y="1828800"/>
+            <a:off x="258189" y="1828800"/>
             <a:ext cx="1445760" cy="731160"/>
             <a:chOff x="109800" y="1828800"/>
             <a:chExt cx="1445760" cy="731160"/>
@@ -2743,7 +2792,7 @@
         </p:nvGrpSpPr>
         <p:grpSpPr>
           <a:xfrm>
-            <a:off x="2014800" y="1975680"/>
+            <a:off x="2335640" y="1975680"/>
             <a:ext cx="1384560" cy="456480"/>
             <a:chOff x="1938600" y="1975680"/>
             <a:chExt cx="1384560" cy="456480"/>
@@ -2850,7 +2899,7 @@
         </p:nvSpPr>
         <p:spPr>
           <a:xfrm>
-            <a:off x="2328000" y="3520440"/>
+            <a:off x="2464357" y="3520440"/>
             <a:ext cx="1384560" cy="456480"/>
           </a:xfrm>
           <a:prstGeom prst="rect">
@@ -2884,7 +2933,7 @@
         </p:nvSpPr>
         <p:spPr>
           <a:xfrm>
-            <a:off x="2414337" y="3606265"/>
+            <a:off x="2550694" y="3606265"/>
             <a:ext cx="1232615" cy="320614"/>
           </a:xfrm>
           <a:prstGeom prst="rect">
@@ -2942,7 +2991,7 @@
         </p:nvGrpSpPr>
         <p:grpSpPr>
           <a:xfrm>
-            <a:off x="5683200" y="2688840"/>
+            <a:off x="5819557" y="2688840"/>
             <a:ext cx="1186920" cy="456480"/>
             <a:chOff x="5607000" y="2688840"/>
             <a:chExt cx="1186920" cy="456480"/>
@@ -3049,7 +3098,7 @@
         </p:nvSpPr>
         <p:spPr>
           <a:xfrm>
-            <a:off x="7160161" y="2612880"/>
+            <a:off x="7296518" y="2612880"/>
             <a:ext cx="1204920" cy="587160"/>
           </a:xfrm>
           <a:prstGeom prst="ellipse">
@@ -3083,8 +3132,8 @@
         </p:nvSpPr>
         <p:spPr>
           <a:xfrm>
-            <a:off x="7444921" y="2762640"/>
-            <a:ext cx="626040" cy="289440"/>
+            <a:off x="4772990" y="1522074"/>
+            <a:ext cx="1497645" cy="420153"/>
           </a:xfrm>
           <a:prstGeom prst="rect">
             <a:avLst/>
@@ -3118,16 +3167,16 @@
               </a:lnSpc>
             </a:pPr>
             <a:r>
-              <a:rPr lang="en-US" sz="1400" b="0" strike="noStrike" spc="-1" dirty="0">
+              <a:rPr lang="en-US" sz="3200" b="0" i="1" strike="noStrike" spc="-1" dirty="0" smtClean="0">
                 <a:solidFill>
                   <a:srgbClr val="000000"/>
                 </a:solidFill>
                 <a:latin typeface="Arial"/>
                 <a:ea typeface="DejaVu Sans"/>
               </a:rPr>
-              <a:t>Mixer</a:t>
+              <a:t>Core</a:t>
             </a:r>
-            <a:endParaRPr lang="en-US" sz="1400" b="0" strike="noStrike" spc="-1" dirty="0">
+            <a:endParaRPr lang="en-US" sz="3200" b="0" i="1" strike="noStrike" spc="-1" dirty="0">
               <a:latin typeface="Arial"/>
             </a:endParaRPr>
           </a:p>
@@ -3141,7 +3190,7 @@
         </p:nvSpPr>
         <p:spPr>
           <a:xfrm>
-            <a:off x="3945840" y="2551320"/>
+            <a:off x="4082197" y="2551320"/>
             <a:ext cx="1463040" cy="730800"/>
           </a:xfrm>
           <a:prstGeom prst="ellipse">
@@ -3175,7 +3224,7 @@
         </p:nvSpPr>
         <p:spPr>
           <a:xfrm>
-            <a:off x="3965280" y="2632680"/>
+            <a:off x="4101637" y="2632680"/>
             <a:ext cx="1465560" cy="315360"/>
           </a:xfrm>
           <a:prstGeom prst="rect">
@@ -3253,7 +3302,7 @@
         </p:nvSpPr>
         <p:spPr>
           <a:xfrm>
-            <a:off x="130560" y="3260222"/>
+            <a:off x="58371" y="3204075"/>
             <a:ext cx="1737000" cy="1096920"/>
           </a:xfrm>
           <a:prstGeom prst="ellipse">
@@ -3287,7 +3336,7 @@
         </p:nvSpPr>
         <p:spPr>
           <a:xfrm>
-            <a:off x="554220" y="3324256"/>
+            <a:off x="482031" y="3268109"/>
             <a:ext cx="925200" cy="315360"/>
           </a:xfrm>
           <a:prstGeom prst="rect">
@@ -3345,7 +3394,7 @@
         </p:nvSpPr>
         <p:spPr>
           <a:xfrm>
-            <a:off x="583080" y="3886774"/>
+            <a:off x="510891" y="3830627"/>
             <a:ext cx="785520" cy="420840"/>
           </a:xfrm>
           <a:prstGeom prst="ellipse">
@@ -3379,7 +3428,7 @@
         </p:nvSpPr>
         <p:spPr>
           <a:xfrm>
-            <a:off x="722231" y="3943934"/>
+            <a:off x="650042" y="3887787"/>
             <a:ext cx="528840" cy="290880"/>
           </a:xfrm>
           <a:prstGeom prst="rect">
@@ -3431,14 +3480,14 @@
       </p:sp>
       <p:sp>
         <p:nvSpPr>
-          <p:cNvPr id="59" name="CustomShape 22"/>
+          <p:cNvPr id="63" name="CustomShape 26"/>
           <p:cNvSpPr/>
           <p:nvPr/>
         </p:nvSpPr>
         <p:spPr>
-          <a:xfrm flipV="1">
-            <a:off x="1867920" y="3747960"/>
-            <a:ext cx="460080" cy="360"/>
+          <a:xfrm>
+            <a:off x="5545597" y="2916720"/>
+            <a:ext cx="273960" cy="360"/>
           </a:xfrm>
           <a:custGeom>
             <a:avLst/>
@@ -3480,14 +3529,14 @@
       </p:sp>
       <p:sp>
         <p:nvSpPr>
-          <p:cNvPr id="60" name="CustomShape 23"/>
+          <p:cNvPr id="64" name="CustomShape 27"/>
           <p:cNvSpPr/>
           <p:nvPr/>
         </p:nvSpPr>
         <p:spPr>
-          <a:xfrm>
-            <a:off x="1632120" y="2194560"/>
-            <a:ext cx="382680" cy="9360"/>
+          <a:xfrm flipV="1">
+            <a:off x="7015275" y="2904840"/>
+            <a:ext cx="275760" cy="3600"/>
           </a:xfrm>
           <a:custGeom>
             <a:avLst/>
@@ -3529,38 +3578,23 @@
       </p:sp>
       <p:sp>
         <p:nvSpPr>
-          <p:cNvPr id="61" name="CustomShape 24"/>
+          <p:cNvPr id="65" name="CustomShape 28"/>
           <p:cNvSpPr/>
           <p:nvPr/>
         </p:nvSpPr>
         <p:spPr>
           <a:xfrm>
-            <a:off x="3399720" y="2203920"/>
-            <a:ext cx="544320" cy="719280"/>
-          </a:xfrm>
-          <a:custGeom>
-            <a:avLst/>
-            <a:gdLst/>
-            <a:ahLst/>
-            <a:cxnLst/>
-            <a:rect l="l" t="t" r="r" b="b"/>
-            <a:pathLst>
-              <a:path w="21600" h="21600">
-                <a:moveTo>
-                  <a:pt x="0" y="0"/>
-                </a:moveTo>
-                <a:lnTo>
-                  <a:pt x="21600" y="21600"/>
-                </a:lnTo>
-              </a:path>
-            </a:pathLst>
-          </a:custGeom>
-          <a:noFill/>
+            <a:off x="9024795" y="2679192"/>
+            <a:ext cx="987480" cy="456480"/>
+          </a:xfrm>
+          <a:prstGeom prst="rect">
+            <a:avLst/>
+          </a:prstGeom>
+          <a:solidFill>
+            <a:srgbClr val="729FCF"/>
+          </a:solidFill>
           <a:ln>
-            <a:solidFill>
-              <a:srgbClr val="000000"/>
-            </a:solidFill>
-            <a:tailEnd type="triangle" w="med" len="med"/>
+            <a:noFill/>
           </a:ln>
         </p:spPr>
         <p:style>
@@ -3578,38 +3612,21 @@
       </p:sp>
       <p:sp>
         <p:nvSpPr>
-          <p:cNvPr id="62" name="CustomShape 25"/>
+          <p:cNvPr id="66" name="CustomShape 29"/>
           <p:cNvSpPr/>
           <p:nvPr/>
         </p:nvSpPr>
         <p:spPr>
-          <a:xfrm flipV="1">
-            <a:off x="3712920" y="2922480"/>
-            <a:ext cx="231120" cy="825480"/>
-          </a:xfrm>
-          <a:custGeom>
-            <a:avLst/>
-            <a:gdLst/>
-            <a:ahLst/>
-            <a:cxnLst/>
-            <a:rect l="l" t="t" r="r" b="b"/>
-            <a:pathLst>
-              <a:path w="21600" h="21600">
-                <a:moveTo>
-                  <a:pt x="0" y="0"/>
-                </a:moveTo>
-                <a:lnTo>
-                  <a:pt x="21600" y="21600"/>
-                </a:lnTo>
-              </a:path>
-            </a:pathLst>
-          </a:custGeom>
+          <a:xfrm>
+            <a:off x="9098235" y="2742120"/>
+            <a:ext cx="840600" cy="315360"/>
+          </a:xfrm>
+          <a:prstGeom prst="rect">
+            <a:avLst/>
+          </a:prstGeom>
           <a:noFill/>
           <a:ln>
-            <a:solidFill>
-              <a:srgbClr val="000000"/>
-            </a:solidFill>
-            <a:tailEnd type="triangle" w="med" len="med"/>
+            <a:noFill/>
           </a:ln>
         </p:spPr>
         <p:style>
@@ -3624,170 +3641,6 @@
           </a:effectRef>
           <a:fontRef idx="minor"/>
         </p:style>
-      </p:sp>
-      <p:sp>
-        <p:nvSpPr>
-          <p:cNvPr id="63" name="CustomShape 26"/>
-          <p:cNvSpPr/>
-          <p:nvPr/>
-        </p:nvSpPr>
-        <p:spPr>
-          <a:xfrm>
-            <a:off x="5409240" y="2916720"/>
-            <a:ext cx="273960" cy="360"/>
-          </a:xfrm>
-          <a:custGeom>
-            <a:avLst/>
-            <a:gdLst/>
-            <a:ahLst/>
-            <a:cxnLst/>
-            <a:rect l="l" t="t" r="r" b="b"/>
-            <a:pathLst>
-              <a:path w="21600" h="21600">
-                <a:moveTo>
-                  <a:pt x="0" y="0"/>
-                </a:moveTo>
-                <a:lnTo>
-                  <a:pt x="21600" y="21600"/>
-                </a:lnTo>
-              </a:path>
-            </a:pathLst>
-          </a:custGeom>
-          <a:noFill/>
-          <a:ln>
-            <a:solidFill>
-              <a:srgbClr val="000000"/>
-            </a:solidFill>
-            <a:tailEnd type="triangle" w="med" len="med"/>
-          </a:ln>
-        </p:spPr>
-        <p:style>
-          <a:lnRef idx="0">
-            <a:scrgbClr r="0" g="0" b="0"/>
-          </a:lnRef>
-          <a:fillRef idx="0">
-            <a:scrgbClr r="0" g="0" b="0"/>
-          </a:fillRef>
-          <a:effectRef idx="0">
-            <a:scrgbClr r="0" g="0" b="0"/>
-          </a:effectRef>
-          <a:fontRef idx="minor"/>
-        </p:style>
-      </p:sp>
-      <p:sp>
-        <p:nvSpPr>
-          <p:cNvPr id="64" name="CustomShape 27"/>
-          <p:cNvSpPr/>
-          <p:nvPr/>
-        </p:nvSpPr>
-        <p:spPr>
-          <a:xfrm flipV="1">
-            <a:off x="6878918" y="2904840"/>
-            <a:ext cx="275760" cy="3600"/>
-          </a:xfrm>
-          <a:custGeom>
-            <a:avLst/>
-            <a:gdLst/>
-            <a:ahLst/>
-            <a:cxnLst/>
-            <a:rect l="l" t="t" r="r" b="b"/>
-            <a:pathLst>
-              <a:path w="21600" h="21600">
-                <a:moveTo>
-                  <a:pt x="0" y="0"/>
-                </a:moveTo>
-                <a:lnTo>
-                  <a:pt x="21600" y="21600"/>
-                </a:lnTo>
-              </a:path>
-            </a:pathLst>
-          </a:custGeom>
-          <a:noFill/>
-          <a:ln>
-            <a:solidFill>
-              <a:srgbClr val="000000"/>
-            </a:solidFill>
-            <a:tailEnd type="triangle" w="med" len="med"/>
-          </a:ln>
-        </p:spPr>
-        <p:style>
-          <a:lnRef idx="0">
-            <a:scrgbClr r="0" g="0" b="0"/>
-          </a:lnRef>
-          <a:fillRef idx="0">
-            <a:scrgbClr r="0" g="0" b="0"/>
-          </a:fillRef>
-          <a:effectRef idx="0">
-            <a:scrgbClr r="0" g="0" b="0"/>
-          </a:effectRef>
-          <a:fontRef idx="minor"/>
-        </p:style>
-      </p:sp>
-      <p:sp>
-        <p:nvSpPr>
-          <p:cNvPr id="65" name="CustomShape 28"/>
-          <p:cNvSpPr/>
-          <p:nvPr/>
-        </p:nvSpPr>
-        <p:spPr>
-          <a:xfrm>
-            <a:off x="8752081" y="2671560"/>
-            <a:ext cx="987480" cy="456480"/>
-          </a:xfrm>
-          <a:prstGeom prst="rect">
-            <a:avLst/>
-          </a:prstGeom>
-          <a:solidFill>
-            <a:srgbClr val="729FCF"/>
-          </a:solidFill>
-          <a:ln>
-            <a:noFill/>
-          </a:ln>
-        </p:spPr>
-        <p:style>
-          <a:lnRef idx="0">
-            <a:scrgbClr r="0" g="0" b="0"/>
-          </a:lnRef>
-          <a:fillRef idx="0">
-            <a:scrgbClr r="0" g="0" b="0"/>
-          </a:fillRef>
-          <a:effectRef idx="0">
-            <a:scrgbClr r="0" g="0" b="0"/>
-          </a:effectRef>
-          <a:fontRef idx="minor"/>
-        </p:style>
-      </p:sp>
-      <p:sp>
-        <p:nvSpPr>
-          <p:cNvPr id="66" name="CustomShape 29"/>
-          <p:cNvSpPr/>
-          <p:nvPr/>
-        </p:nvSpPr>
-        <p:spPr>
-          <a:xfrm>
-            <a:off x="8898961" y="2763000"/>
-            <a:ext cx="840600" cy="315360"/>
-          </a:xfrm>
-          <a:prstGeom prst="rect">
-            <a:avLst/>
-          </a:prstGeom>
-          <a:noFill/>
-          <a:ln>
-            <a:noFill/>
-          </a:ln>
-        </p:spPr>
-        <p:style>
-          <a:lnRef idx="0">
-            <a:scrgbClr r="0" g="0" b="0"/>
-          </a:lnRef>
-          <a:fillRef idx="0">
-            <a:scrgbClr r="0" g="0" b="0"/>
-          </a:fillRef>
-          <a:effectRef idx="0">
-            <a:scrgbClr r="0" g="0" b="0"/>
-          </a:effectRef>
-          <a:fontRef idx="minor"/>
-        </p:style>
         <p:txBody>
           <a:bodyPr lIns="90000" tIns="45000" rIns="90000" bIns="45000">
             <a:noAutofit/>
@@ -3800,69 +3653,20 @@
               </a:lnSpc>
             </a:pPr>
             <a:r>
-              <a:rPr lang="en-US" sz="1400" b="0" strike="noStrike" spc="-1">
+              <a:rPr lang="en-US" sz="1400" b="0" strike="noStrike" spc="-1" dirty="0" smtClean="0">
                 <a:solidFill>
                   <a:srgbClr val="000000"/>
                 </a:solidFill>
                 <a:latin typeface="Arial"/>
                 <a:ea typeface="DejaVu Sans"/>
               </a:rPr>
-              <a:t>Motors</a:t>
+              <a:t> Motors</a:t>
             </a:r>
-            <a:endParaRPr lang="en-US" sz="1400" b="0" strike="noStrike" spc="-1">
+            <a:endParaRPr lang="en-US" sz="1400" b="0" strike="noStrike" spc="-1" dirty="0">
               <a:latin typeface="Arial"/>
             </a:endParaRPr>
           </a:p>
         </p:txBody>
-      </p:sp>
-      <p:sp>
-        <p:nvSpPr>
-          <p:cNvPr id="67" name="CustomShape 30"/>
-          <p:cNvSpPr/>
-          <p:nvPr/>
-        </p:nvSpPr>
-        <p:spPr>
-          <a:xfrm flipV="1">
-            <a:off x="8365441" y="2899080"/>
-            <a:ext cx="386640" cy="6840"/>
-          </a:xfrm>
-          <a:custGeom>
-            <a:avLst/>
-            <a:gdLst/>
-            <a:ahLst/>
-            <a:cxnLst/>
-            <a:rect l="l" t="t" r="r" b="b"/>
-            <a:pathLst>
-              <a:path w="21600" h="21600">
-                <a:moveTo>
-                  <a:pt x="0" y="0"/>
-                </a:moveTo>
-                <a:lnTo>
-                  <a:pt x="21600" y="21600"/>
-                </a:lnTo>
-              </a:path>
-            </a:pathLst>
-          </a:custGeom>
-          <a:noFill/>
-          <a:ln>
-            <a:solidFill>
-              <a:srgbClr val="000000"/>
-            </a:solidFill>
-            <a:tailEnd type="triangle" w="med" len="med"/>
-          </a:ln>
-        </p:spPr>
-        <p:style>
-          <a:lnRef idx="0">
-            <a:scrgbClr r="0" g="0" b="0"/>
-          </a:lnRef>
-          <a:fillRef idx="0">
-            <a:scrgbClr r="0" g="0" b="0"/>
-          </a:fillRef>
-          <a:effectRef idx="0">
-            <a:scrgbClr r="0" g="0" b="0"/>
-          </a:effectRef>
-          <a:fontRef idx="minor"/>
-        </p:style>
       </p:sp>
       <p:cxnSp>
         <p:nvCxnSpPr>
@@ -3875,7 +3679,7 @@
         </p:nvCxnSpPr>
         <p:spPr>
           <a:xfrm rot="16200000" flipV="1">
-            <a:off x="4677360" y="2141080"/>
+            <a:off x="4813717" y="2141080"/>
             <a:ext cx="12700" cy="1034526"/>
           </a:xfrm>
           <a:prstGeom prst="curvedConnector3">
@@ -3916,7 +3720,7 @@
         </p:nvCxnSpPr>
         <p:spPr>
           <a:xfrm rot="16200000" flipV="1">
-            <a:off x="896460" y="1433505"/>
+            <a:off x="968649" y="1433505"/>
             <a:ext cx="12700" cy="1004742"/>
           </a:xfrm>
           <a:prstGeom prst="curvedConnector3">
@@ -3957,7 +3761,7 @@
         </p:nvCxnSpPr>
         <p:spPr>
           <a:xfrm rot="16200000" flipV="1">
-            <a:off x="975840" y="3670682"/>
+            <a:off x="903651" y="3614535"/>
             <a:ext cx="12700" cy="555446"/>
           </a:xfrm>
           <a:prstGeom prst="curvedConnector3">
@@ -3987,6 +3791,259 @@
           </a:fontRef>
         </p:style>
       </p:cxnSp>
+      <p:cxnSp>
+        <p:nvCxnSpPr>
+          <p:cNvPr id="4" name="Straight Arrow Connector 3"/>
+          <p:cNvCxnSpPr>
+            <a:stCxn id="49" idx="6"/>
+            <a:endCxn id="65" idx="1"/>
+          </p:cNvCxnSpPr>
+          <p:nvPr/>
+        </p:nvCxnSpPr>
+        <p:spPr>
+          <a:xfrm>
+            <a:off x="8501438" y="2906460"/>
+            <a:ext cx="523357" cy="972"/>
+          </a:xfrm>
+          <a:prstGeom prst="straightConnector1">
+            <a:avLst/>
+          </a:prstGeom>
+          <a:ln>
+            <a:solidFill>
+              <a:schemeClr val="tx1"/>
+            </a:solidFill>
+            <a:tailEnd type="triangle"/>
+          </a:ln>
+        </p:spPr>
+        <p:style>
+          <a:lnRef idx="1">
+            <a:schemeClr val="accent1"/>
+          </a:lnRef>
+          <a:fillRef idx="0">
+            <a:schemeClr val="accent1"/>
+          </a:fillRef>
+          <a:effectRef idx="0">
+            <a:schemeClr val="accent1"/>
+          </a:effectRef>
+          <a:fontRef idx="minor">
+            <a:schemeClr val="tx1"/>
+          </a:fontRef>
+        </p:style>
+      </p:cxnSp>
+      <p:cxnSp>
+        <p:nvCxnSpPr>
+          <p:cNvPr id="36" name="Straight Arrow Connector 35"/>
+          <p:cNvCxnSpPr>
+            <a:stCxn id="39" idx="6"/>
+            <a:endCxn id="42" idx="1"/>
+          </p:cNvCxnSpPr>
+          <p:nvPr/>
+        </p:nvCxnSpPr>
+        <p:spPr>
+          <a:xfrm>
+            <a:off x="1679109" y="2194380"/>
+            <a:ext cx="656531" cy="9540"/>
+          </a:xfrm>
+          <a:prstGeom prst="straightConnector1">
+            <a:avLst/>
+          </a:prstGeom>
+          <a:ln>
+            <a:solidFill>
+              <a:schemeClr val="tx1"/>
+            </a:solidFill>
+            <a:tailEnd type="triangle"/>
+          </a:ln>
+        </p:spPr>
+        <p:style>
+          <a:lnRef idx="1">
+            <a:schemeClr val="accent1"/>
+          </a:lnRef>
+          <a:fillRef idx="0">
+            <a:schemeClr val="accent1"/>
+          </a:fillRef>
+          <a:effectRef idx="0">
+            <a:schemeClr val="accent1"/>
+          </a:effectRef>
+          <a:fontRef idx="minor">
+            <a:schemeClr val="tx1"/>
+          </a:fontRef>
+        </p:style>
+      </p:cxnSp>
+      <p:cxnSp>
+        <p:nvCxnSpPr>
+          <p:cNvPr id="53" name="Straight Arrow Connector 52"/>
+          <p:cNvCxnSpPr>
+            <a:stCxn id="54" idx="6"/>
+            <a:endCxn id="44" idx="1"/>
+          </p:cNvCxnSpPr>
+          <p:nvPr/>
+        </p:nvCxnSpPr>
+        <p:spPr>
+          <a:xfrm flipV="1">
+            <a:off x="1795371" y="3748680"/>
+            <a:ext cx="668986" cy="3855"/>
+          </a:xfrm>
+          <a:prstGeom prst="straightConnector1">
+            <a:avLst/>
+          </a:prstGeom>
+          <a:ln>
+            <a:solidFill>
+              <a:schemeClr val="tx1"/>
+            </a:solidFill>
+            <a:tailEnd type="triangle"/>
+          </a:ln>
+        </p:spPr>
+        <p:style>
+          <a:lnRef idx="1">
+            <a:schemeClr val="accent1"/>
+          </a:lnRef>
+          <a:fillRef idx="0">
+            <a:schemeClr val="accent1"/>
+          </a:fillRef>
+          <a:effectRef idx="0">
+            <a:schemeClr val="accent1"/>
+          </a:effectRef>
+          <a:fontRef idx="minor">
+            <a:schemeClr val="tx1"/>
+          </a:fontRef>
+        </p:style>
+      </p:cxnSp>
+      <p:cxnSp>
+        <p:nvCxnSpPr>
+          <p:cNvPr id="56" name="Straight Arrow Connector 55"/>
+          <p:cNvCxnSpPr>
+            <a:stCxn id="42" idx="3"/>
+            <a:endCxn id="52" idx="1"/>
+          </p:cNvCxnSpPr>
+          <p:nvPr/>
+        </p:nvCxnSpPr>
+        <p:spPr>
+          <a:xfrm>
+            <a:off x="3720200" y="2203920"/>
+            <a:ext cx="381437" cy="586440"/>
+          </a:xfrm>
+          <a:prstGeom prst="straightConnector1">
+            <a:avLst/>
+          </a:prstGeom>
+          <a:ln>
+            <a:solidFill>
+              <a:schemeClr val="tx1"/>
+            </a:solidFill>
+            <a:tailEnd type="triangle"/>
+          </a:ln>
+        </p:spPr>
+        <p:style>
+          <a:lnRef idx="1">
+            <a:schemeClr val="accent1"/>
+          </a:lnRef>
+          <a:fillRef idx="0">
+            <a:schemeClr val="accent1"/>
+          </a:fillRef>
+          <a:effectRef idx="0">
+            <a:schemeClr val="accent1"/>
+          </a:effectRef>
+          <a:fontRef idx="minor">
+            <a:schemeClr val="tx1"/>
+          </a:fontRef>
+        </p:style>
+      </p:cxnSp>
+      <p:cxnSp>
+        <p:nvCxnSpPr>
+          <p:cNvPr id="69" name="Straight Arrow Connector 68"/>
+          <p:cNvCxnSpPr>
+            <a:stCxn id="44" idx="3"/>
+            <a:endCxn id="51" idx="3"/>
+          </p:cNvCxnSpPr>
+          <p:nvPr/>
+        </p:nvCxnSpPr>
+        <p:spPr>
+          <a:xfrm flipV="1">
+            <a:off x="3848917" y="3175097"/>
+            <a:ext cx="447537" cy="573583"/>
+          </a:xfrm>
+          <a:prstGeom prst="straightConnector1">
+            <a:avLst/>
+          </a:prstGeom>
+          <a:ln>
+            <a:solidFill>
+              <a:schemeClr val="tx1"/>
+            </a:solidFill>
+            <a:tailEnd type="triangle"/>
+          </a:ln>
+        </p:spPr>
+        <p:style>
+          <a:lnRef idx="1">
+            <a:schemeClr val="accent1"/>
+          </a:lnRef>
+          <a:fillRef idx="0">
+            <a:schemeClr val="accent1"/>
+          </a:fillRef>
+          <a:effectRef idx="0">
+            <a:schemeClr val="accent1"/>
+          </a:effectRef>
+          <a:fontRef idx="minor">
+            <a:schemeClr val="tx1"/>
+          </a:fontRef>
+        </p:style>
+      </p:cxnSp>
+      <p:sp>
+        <p:nvSpPr>
+          <p:cNvPr id="70" name="CustomShape 13"/>
+          <p:cNvSpPr/>
+          <p:nvPr/>
+        </p:nvSpPr>
+        <p:spPr>
+          <a:xfrm>
+            <a:off x="7626523" y="2778953"/>
+            <a:ext cx="626040" cy="289440"/>
+          </a:xfrm>
+          <a:prstGeom prst="rect">
+            <a:avLst/>
+          </a:prstGeom>
+          <a:noFill/>
+          <a:ln>
+            <a:noFill/>
+          </a:ln>
+        </p:spPr>
+        <p:style>
+          <a:lnRef idx="0">
+            <a:scrgbClr r="0" g="0" b="0"/>
+          </a:lnRef>
+          <a:fillRef idx="0">
+            <a:scrgbClr r="0" g="0" b="0"/>
+          </a:fillRef>
+          <a:effectRef idx="0">
+            <a:scrgbClr r="0" g="0" b="0"/>
+          </a:effectRef>
+          <a:fontRef idx="minor"/>
+        </p:style>
+        <p:txBody>
+          <a:bodyPr lIns="90000" tIns="45000" rIns="90000" bIns="45000">
+            <a:noAutofit/>
+          </a:bodyPr>
+          <a:lstStyle/>
+          <a:p>
+            <a:pPr>
+              <a:lnSpc>
+                <a:spcPct val="100000"/>
+              </a:lnSpc>
+            </a:pPr>
+            <a:r>
+              <a:rPr lang="en-US" sz="1400" b="0" strike="noStrike" spc="-1" dirty="0">
+                <a:solidFill>
+                  <a:srgbClr val="000000"/>
+                </a:solidFill>
+                <a:latin typeface="Arial"/>
+                <a:ea typeface="DejaVu Sans"/>
+              </a:rPr>
+              <a:t>Mixer</a:t>
+            </a:r>
+            <a:endParaRPr lang="en-US" sz="1400" b="0" strike="noStrike" spc="-1" dirty="0">
+              <a:latin typeface="Arial"/>
+            </a:endParaRPr>
+          </a:p>
+        </p:txBody>
+      </p:sp>
     </p:spTree>
   </p:cSld>
   <p:clrMapOvr>
@@ -3996,7 +4053,7 @@
     <mc:Choice Requires="p14">
       <p:transition spd="slow" p14:dur="2000"/>
     </mc:Choice>
-    <mc:Fallback xmlns="" xmlns:p15="http://schemas.microsoft.com/office/powerpoint/2012/main">
+    <mc:Fallback xmlns:p15="http://schemas.microsoft.com/office/powerpoint/2012/main" xmlns="">
       <p:transition spd="slow"/>
     </mc:Fallback>
   </mc:AlternateContent>

</xml_diff>